<commit_message>
Updated style of first 6 slides/content
</commit_message>
<xml_diff>
--- a/Documentation/Team Presentation.pptx
+++ b/Documentation/Team Presentation.pptx
@@ -6,22 +6,23 @@
   </p:sldMasterIdLst>
   <p:sldIdLst>
     <p:sldId id="256" r:id="rId2"/>
-    <p:sldId id="259" r:id="rId3"/>
-    <p:sldId id="261" r:id="rId4"/>
-    <p:sldId id="260" r:id="rId5"/>
-    <p:sldId id="258" r:id="rId6"/>
-    <p:sldId id="262" r:id="rId7"/>
-    <p:sldId id="271" r:id="rId8"/>
-    <p:sldId id="263" r:id="rId9"/>
-    <p:sldId id="265" r:id="rId10"/>
-    <p:sldId id="264" r:id="rId11"/>
-    <p:sldId id="273" r:id="rId12"/>
-    <p:sldId id="267" r:id="rId13"/>
-    <p:sldId id="266" r:id="rId14"/>
-    <p:sldId id="268" r:id="rId15"/>
-    <p:sldId id="272" r:id="rId16"/>
-    <p:sldId id="270" r:id="rId17"/>
-    <p:sldId id="274" r:id="rId18"/>
+    <p:sldId id="275" r:id="rId3"/>
+    <p:sldId id="260" r:id="rId4"/>
+    <p:sldId id="276" r:id="rId5"/>
+    <p:sldId id="277" r:id="rId6"/>
+    <p:sldId id="258" r:id="rId7"/>
+    <p:sldId id="262" r:id="rId8"/>
+    <p:sldId id="271" r:id="rId9"/>
+    <p:sldId id="263" r:id="rId10"/>
+    <p:sldId id="265" r:id="rId11"/>
+    <p:sldId id="264" r:id="rId12"/>
+    <p:sldId id="273" r:id="rId13"/>
+    <p:sldId id="267" r:id="rId14"/>
+    <p:sldId id="266" r:id="rId15"/>
+    <p:sldId id="268" r:id="rId16"/>
+    <p:sldId id="272" r:id="rId17"/>
+    <p:sldId id="270" r:id="rId18"/>
+    <p:sldId id="274" r:id="rId19"/>
   </p:sldIdLst>
   <p:sldSz cx="12192000" cy="6858000"/>
   <p:notesSz cx="6858000" cy="9144000"/>
@@ -1618,11 +1619,11 @@
   <dgm:cxnLst>
     <dgm:cxn modelId="{A73E1E02-A971-4CE6-88B8-0C3CDDA11D02}" type="presOf" srcId="{AAA63983-D68E-4A8B-B03B-3C1FFF76F581}" destId="{C8DAC8D9-9149-4362-BF7E-15A36EC0D026}" srcOrd="0" destOrd="0" presId="urn:microsoft.com/office/officeart/2005/8/layout/vList2"/>
     <dgm:cxn modelId="{76B2151B-AFE0-4C96-8D4C-C1C93E24AD52}" type="presOf" srcId="{D35016B1-1E58-49A6-A90F-AE164845F484}" destId="{E9D7CDE4-31A3-4EA3-9AA5-9F1E46B4D453}" srcOrd="0" destOrd="0" presId="urn:microsoft.com/office/officeart/2005/8/layout/vList2"/>
+    <dgm:cxn modelId="{7AB02045-C918-48AF-84E8-540E49876297}" type="presOf" srcId="{1399077D-786A-4A8B-96FF-069E374D53A4}" destId="{12C1BE6B-9C21-4880-AEEB-69E89095A044}" srcOrd="0" destOrd="0" presId="urn:microsoft.com/office/officeart/2005/8/layout/vList2"/>
+    <dgm:cxn modelId="{618CBC57-B66C-4BCA-9B9F-8C70431F07BD}" srcId="{1399077D-786A-4A8B-96FF-069E374D53A4}" destId="{DA7A2490-46D7-4DF8-ABD8-87418D4B2495}" srcOrd="4" destOrd="0" parTransId="{A0088338-F937-4DFD-BD92-056BC1050153}" sibTransId="{49CF1918-330B-42E1-B11D-DD018F493333}"/>
     <dgm:cxn modelId="{514F6B5E-7D1E-42B4-BFB5-47566781C3FE}" srcId="{1399077D-786A-4A8B-96FF-069E374D53A4}" destId="{D35016B1-1E58-49A6-A90F-AE164845F484}" srcOrd="5" destOrd="0" parTransId="{F5BCEC52-3827-497E-9913-5B11897E8705}" sibTransId="{4D21F759-526B-4D9C-A30C-8F75A23453D6}"/>
     <dgm:cxn modelId="{B4C5CA5E-67C0-4FF0-8E4C-8988B9A6A6FF}" type="presOf" srcId="{A97F382E-B46E-4B12-AFF9-C171B34D570D}" destId="{B2C7831D-91AA-4608-A9F2-D7744E57A1E0}" srcOrd="0" destOrd="0" presId="urn:microsoft.com/office/officeart/2005/8/layout/vList2"/>
     <dgm:cxn modelId="{7B62C962-134D-43F1-8959-05C07C26F7CE}" type="presOf" srcId="{5584A5D7-B605-44C9-955D-3F896FD47551}" destId="{ACC9DE83-3321-4C36-A664-56ED41D8F075}" srcOrd="0" destOrd="0" presId="urn:microsoft.com/office/officeart/2005/8/layout/vList2"/>
-    <dgm:cxn modelId="{7AB02045-C918-48AF-84E8-540E49876297}" type="presOf" srcId="{1399077D-786A-4A8B-96FF-069E374D53A4}" destId="{12C1BE6B-9C21-4880-AEEB-69E89095A044}" srcOrd="0" destOrd="0" presId="urn:microsoft.com/office/officeart/2005/8/layout/vList2"/>
-    <dgm:cxn modelId="{618CBC57-B66C-4BCA-9B9F-8C70431F07BD}" srcId="{1399077D-786A-4A8B-96FF-069E374D53A4}" destId="{DA7A2490-46D7-4DF8-ABD8-87418D4B2495}" srcOrd="4" destOrd="0" parTransId="{A0088338-F937-4DFD-BD92-056BC1050153}" sibTransId="{49CF1918-330B-42E1-B11D-DD018F493333}"/>
     <dgm:cxn modelId="{D7359991-6172-4228-A54B-423423ABA43E}" srcId="{1399077D-786A-4A8B-96FF-069E374D53A4}" destId="{AAA63983-D68E-4A8B-B03B-3C1FFF76F581}" srcOrd="2" destOrd="0" parTransId="{5E7AE698-1A13-4559-A5B2-496E37CA8EB5}" sibTransId="{E208EA3F-3668-403E-BDC2-EEADFB43121B}"/>
     <dgm:cxn modelId="{31DA9B9A-5B3B-42CD-96BA-E4464C03DCBC}" type="presOf" srcId="{1464B62F-AD34-4446-A166-B5AC6A86121F}" destId="{13C36F74-2D6C-45C2-A57B-6728B59BBE28}" srcOrd="0" destOrd="0" presId="urn:microsoft.com/office/officeart/2005/8/layout/vList2"/>
     <dgm:cxn modelId="{36918A9E-33FE-4F4B-8072-D75DA79E183F}" srcId="{1399077D-786A-4A8B-96FF-069E374D53A4}" destId="{A97F382E-B46E-4B12-AFF9-C171B34D570D}" srcOrd="1" destOrd="0" parTransId="{E1B6F5AA-8ECB-453A-8AB2-F8EEC09303E7}" sibTransId="{0E4ADDD4-ACA6-4BC5-8841-A56C2BC59A57}"/>
@@ -3597,7 +3598,7 @@
           <a:p>
             <a:fld id="{B4D26D11-37B6-4505-85ED-985B1D1F4AD9}" type="datetimeFigureOut">
               <a:rPr lang="en-GB" smtClean="0"/>
-              <a:t>10/05/2020</a:t>
+              <a:t>11/05/2020</a:t>
             </a:fld>
             <a:endParaRPr lang="en-GB"/>
           </a:p>
@@ -3767,7 +3768,7 @@
           <a:p>
             <a:fld id="{B4D26D11-37B6-4505-85ED-985B1D1F4AD9}" type="datetimeFigureOut">
               <a:rPr lang="en-GB" smtClean="0"/>
-              <a:t>10/05/2020</a:t>
+              <a:t>11/05/2020</a:t>
             </a:fld>
             <a:endParaRPr lang="en-GB"/>
           </a:p>
@@ -3990,7 +3991,7 @@
           <a:p>
             <a:fld id="{B4D26D11-37B6-4505-85ED-985B1D1F4AD9}" type="datetimeFigureOut">
               <a:rPr lang="en-GB" smtClean="0"/>
-              <a:t>10/05/2020</a:t>
+              <a:t>11/05/2020</a:t>
             </a:fld>
             <a:endParaRPr lang="en-GB"/>
           </a:p>
@@ -4170,7 +4171,7 @@
           <a:p>
             <a:fld id="{B4D26D11-37B6-4505-85ED-985B1D1F4AD9}" type="datetimeFigureOut">
               <a:rPr lang="en-GB" smtClean="0"/>
-              <a:t>10/05/2020</a:t>
+              <a:t>11/05/2020</a:t>
             </a:fld>
             <a:endParaRPr lang="en-GB"/>
           </a:p>
@@ -4476,7 +4477,7 @@
           <a:p>
             <a:fld id="{B4D26D11-37B6-4505-85ED-985B1D1F4AD9}" type="datetimeFigureOut">
               <a:rPr lang="en-GB" smtClean="0"/>
-              <a:t>10/05/2020</a:t>
+              <a:t>11/05/2020</a:t>
             </a:fld>
             <a:endParaRPr lang="en-GB"/>
           </a:p>
@@ -4780,7 +4781,7 @@
           <a:p>
             <a:fld id="{B4D26D11-37B6-4505-85ED-985B1D1F4AD9}" type="datetimeFigureOut">
               <a:rPr lang="en-GB" smtClean="0"/>
-              <a:t>10/05/2020</a:t>
+              <a:t>11/05/2020</a:t>
             </a:fld>
             <a:endParaRPr lang="en-GB"/>
           </a:p>
@@ -5202,7 +5203,7 @@
           <a:p>
             <a:fld id="{B4D26D11-37B6-4505-85ED-985B1D1F4AD9}" type="datetimeFigureOut">
               <a:rPr lang="en-GB" smtClean="0"/>
-              <a:t>10/05/2020</a:t>
+              <a:t>11/05/2020</a:t>
             </a:fld>
             <a:endParaRPr lang="en-GB"/>
           </a:p>
@@ -5320,7 +5321,7 @@
           <a:p>
             <a:fld id="{B4D26D11-37B6-4505-85ED-985B1D1F4AD9}" type="datetimeFigureOut">
               <a:rPr lang="en-GB" smtClean="0"/>
-              <a:t>10/05/2020</a:t>
+              <a:t>11/05/2020</a:t>
             </a:fld>
             <a:endParaRPr lang="en-GB"/>
           </a:p>
@@ -5415,7 +5416,7 @@
           <a:p>
             <a:fld id="{B4D26D11-37B6-4505-85ED-985B1D1F4AD9}" type="datetimeFigureOut">
               <a:rPr lang="en-GB" smtClean="0"/>
-              <a:t>10/05/2020</a:t>
+              <a:t>11/05/2020</a:t>
             </a:fld>
             <a:endParaRPr lang="en-GB"/>
           </a:p>
@@ -5688,7 +5689,7 @@
           <a:p>
             <a:fld id="{B4D26D11-37B6-4505-85ED-985B1D1F4AD9}" type="datetimeFigureOut">
               <a:rPr lang="en-GB" smtClean="0"/>
-              <a:t>10/05/2020</a:t>
+              <a:t>11/05/2020</a:t>
             </a:fld>
             <a:endParaRPr lang="en-GB"/>
           </a:p>
@@ -5953,7 +5954,7 @@
           <a:p>
             <a:fld id="{B4D26D11-37B6-4505-85ED-985B1D1F4AD9}" type="datetimeFigureOut">
               <a:rPr lang="en-GB" smtClean="0"/>
-              <a:t>10/05/2020</a:t>
+              <a:t>11/05/2020</a:t>
             </a:fld>
             <a:endParaRPr lang="en-GB"/>
           </a:p>
@@ -6202,7 +6203,7 @@
           <a:p>
             <a:fld id="{B4D26D11-37B6-4505-85ED-985B1D1F4AD9}" type="datetimeFigureOut">
               <a:rPr lang="en-GB" smtClean="0"/>
-              <a:t>10/05/2020</a:t>
+              <a:t>11/05/2020</a:t>
             </a:fld>
             <a:endParaRPr lang="en-GB"/>
           </a:p>
@@ -6820,14 +6821,14 @@
           <a:lstStyle/>
           <a:p>
             <a:r>
-              <a:rPr lang="en-US" sz="4100">
+              <a:rPr lang="en-US" sz="4100" dirty="0">
                 <a:solidFill>
                   <a:schemeClr val="tx2"/>
                 </a:solidFill>
               </a:rPr>
-              <a:t>Supine – team presentation</a:t>
+              <a:t>Supine - team presentation</a:t>
             </a:r>
-            <a:endParaRPr lang="en-GB" sz="4100">
+            <a:endParaRPr lang="en-GB" sz="4100" dirty="0">
               <a:solidFill>
                 <a:schemeClr val="tx2"/>
               </a:solidFill>
@@ -6853,7 +6854,7 @@
         </p:nvSpPr>
         <p:spPr>
           <a:xfrm>
-            <a:off x="7865806" y="3996250"/>
+            <a:off x="7861722" y="4275486"/>
             <a:ext cx="4003106" cy="1942434"/>
           </a:xfrm>
         </p:spPr>
@@ -6864,7 +6865,7 @@
           <a:lstStyle/>
           <a:p>
             <a:r>
-              <a:rPr lang="en-US" sz="1800">
+              <a:rPr lang="en-US" sz="1800" dirty="0">
                 <a:solidFill>
                   <a:schemeClr val="bg2"/>
                 </a:solidFill>
@@ -6874,17 +6875,30 @@
           </a:p>
           <a:p>
             <a:r>
-              <a:rPr lang="en-US" sz="1800">
+              <a:rPr lang="en-US" sz="1800" dirty="0">
                 <a:solidFill>
                   <a:schemeClr val="bg2"/>
                 </a:solidFill>
               </a:rPr>
-              <a:t>Solomon Cammack</a:t>
+              <a:t>Solomon </a:t>
             </a:r>
-          </a:p>
-          <a:p>
             <a:r>
-              <a:rPr lang="en-US" sz="1800">
+              <a:rPr lang="en-US" sz="1800" dirty="0" err="1">
+                <a:solidFill>
+                  <a:schemeClr val="bg2"/>
+                </a:solidFill>
+              </a:rPr>
+              <a:t>Cammack</a:t>
+            </a:r>
+            <a:endParaRPr lang="en-US" sz="1800" dirty="0">
+              <a:solidFill>
+                <a:schemeClr val="bg2"/>
+              </a:solidFill>
+            </a:endParaRPr>
+          </a:p>
+          <a:p>
+            <a:r>
+              <a:rPr lang="en-US" sz="1800" dirty="0">
                 <a:solidFill>
                   <a:schemeClr val="bg2"/>
                 </a:solidFill>
@@ -6894,14 +6908,14 @@
           </a:p>
           <a:p>
             <a:r>
-              <a:rPr lang="en-US" sz="1800">
+              <a:rPr lang="en-US" sz="1800" dirty="0">
                 <a:solidFill>
                   <a:schemeClr val="bg2"/>
                 </a:solidFill>
               </a:rPr>
               <a:t>Zack Hawkins</a:t>
             </a:r>
-            <a:endParaRPr lang="en-GB" sz="1800">
+            <a:endParaRPr lang="en-GB" sz="1800" dirty="0">
               <a:solidFill>
                 <a:schemeClr val="bg2"/>
               </a:solidFill>
@@ -7043,6 +7057,126 @@
           <p:cNvPr id="2" name="Title 1">
             <a:extLst>
               <a:ext uri="{FF2B5EF4-FFF2-40B4-BE49-F238E27FC236}">
+                <a16:creationId xmlns:a16="http://schemas.microsoft.com/office/drawing/2014/main" id="{2BD3129F-8361-4AE5-B2A4-0C52571BB84E}"/>
+              </a:ext>
+            </a:extLst>
+          </p:cNvPr>
+          <p:cNvSpPr>
+            <a:spLocks noGrp="1"/>
+          </p:cNvSpPr>
+          <p:nvPr>
+            <p:ph type="title"/>
+          </p:nvPr>
+        </p:nvSpPr>
+        <p:spPr/>
+        <p:txBody>
+          <a:bodyPr/>
+          <a:lstStyle/>
+          <a:p>
+            <a:r>
+              <a:rPr lang="en-US" dirty="0"/>
+              <a:t>Processes used</a:t>
+            </a:r>
+            <a:endParaRPr lang="en-GB" dirty="0"/>
+          </a:p>
+        </p:txBody>
+      </p:sp>
+      <p:sp>
+        <p:nvSpPr>
+          <p:cNvPr id="3" name="Content Placeholder 2">
+            <a:extLst>
+              <a:ext uri="{FF2B5EF4-FFF2-40B4-BE49-F238E27FC236}">
+                <a16:creationId xmlns:a16="http://schemas.microsoft.com/office/drawing/2014/main" id="{E6490FFA-79CB-4876-8987-89C5113E0593}"/>
+              </a:ext>
+            </a:extLst>
+          </p:cNvPr>
+          <p:cNvSpPr>
+            <a:spLocks noGrp="1"/>
+          </p:cNvSpPr>
+          <p:nvPr>
+            <p:ph idx="1"/>
+          </p:nvPr>
+        </p:nvSpPr>
+        <p:spPr/>
+        <p:txBody>
+          <a:bodyPr/>
+          <a:lstStyle/>
+          <a:p>
+            <a:endParaRPr lang="en-GB" dirty="0"/>
+          </a:p>
+        </p:txBody>
+      </p:sp>
+      <p:pic>
+        <p:nvPicPr>
+          <p:cNvPr id="4" name="Picture 3" descr="A picture containing drawing&#10;&#10;Description automatically generated">
+            <a:extLst>
+              <a:ext uri="{FF2B5EF4-FFF2-40B4-BE49-F238E27FC236}">
+                <a16:creationId xmlns:a16="http://schemas.microsoft.com/office/drawing/2014/main" id="{0C72EFB7-E9E3-4B9A-B96F-4F33E41B3944}"/>
+              </a:ext>
+            </a:extLst>
+          </p:cNvPr>
+          <p:cNvPicPr>
+            <a:picLocks noChangeAspect="1"/>
+          </p:cNvPicPr>
+          <p:nvPr/>
+        </p:nvPicPr>
+        <p:blipFill>
+          <a:blip r:embed="rId2">
+            <a:extLst>
+              <a:ext uri="{28A0092B-C50C-407E-A947-70E740481C1C}">
+                <a14:useLocalDpi xmlns:a14="http://schemas.microsoft.com/office/drawing/2010/main" val="0"/>
+              </a:ext>
+            </a:extLst>
+          </a:blip>
+          <a:stretch>
+            <a:fillRect/>
+          </a:stretch>
+        </p:blipFill>
+        <p:spPr>
+          <a:xfrm>
+            <a:off x="10588487" y="284176"/>
+            <a:ext cx="1506507" cy="1506507"/>
+          </a:xfrm>
+          <a:prstGeom prst="rect">
+            <a:avLst/>
+          </a:prstGeom>
+        </p:spPr>
+      </p:pic>
+    </p:spTree>
+    <p:extLst>
+      <p:ext uri="{BB962C8B-B14F-4D97-AF65-F5344CB8AC3E}">
+        <p14:creationId xmlns:p14="http://schemas.microsoft.com/office/powerpoint/2010/main" val="1207510954"/>
+      </p:ext>
+    </p:extLst>
+  </p:cSld>
+  <p:clrMapOvr>
+    <a:masterClrMapping/>
+  </p:clrMapOvr>
+</p:sld>
+</file>
+
+<file path=ppt/slides/slide11.xml><?xml version="1.0" encoding="utf-8"?>
+<p:sld xmlns:a="http://schemas.openxmlformats.org/drawingml/2006/main" xmlns:r="http://schemas.openxmlformats.org/officeDocument/2006/relationships" xmlns:p="http://schemas.openxmlformats.org/presentationml/2006/main">
+  <p:cSld>
+    <p:spTree>
+      <p:nvGrpSpPr>
+        <p:cNvPr id="1" name=""/>
+        <p:cNvGrpSpPr/>
+        <p:nvPr/>
+      </p:nvGrpSpPr>
+      <p:grpSpPr>
+        <a:xfrm>
+          <a:off x="0" y="0"/>
+          <a:ext cx="0" cy="0"/>
+          <a:chOff x="0" y="0"/>
+          <a:chExt cx="0" cy="0"/>
+        </a:xfrm>
+      </p:grpSpPr>
+      <p:sp>
+        <p:nvSpPr>
+          <p:cNvPr id="2" name="Title 1">
+            <a:extLst>
+              <a:ext uri="{FF2B5EF4-FFF2-40B4-BE49-F238E27FC236}">
                 <a16:creationId xmlns:a16="http://schemas.microsoft.com/office/drawing/2014/main" id="{347036CF-2EA7-403C-BF79-0263FA2B88D9}"/>
               </a:ext>
             </a:extLst>
@@ -7141,7 +7275,7 @@
 </p:sld>
 </file>
 
-<file path=ppt/slides/slide11.xml><?xml version="1.0" encoding="utf-8"?>
+<file path=ppt/slides/slide12.xml><?xml version="1.0" encoding="utf-8"?>
 <p:sld xmlns:a="http://schemas.openxmlformats.org/drawingml/2006/main" xmlns:r="http://schemas.openxmlformats.org/officeDocument/2006/relationships" xmlns:p="http://schemas.openxmlformats.org/presentationml/2006/main">
   <p:cSld>
     <p:spTree>
@@ -7183,9 +7317,6 @@
               <a:rPr lang="en-US" dirty="0"/>
               <a:t>implementation</a:t>
             </a:r>
-            <a:br>
-              <a:rPr lang="en-US" dirty="0"/>
-            </a:br>
             <a:endParaRPr lang="en-GB" dirty="0"/>
           </a:p>
         </p:txBody>
@@ -7264,7 +7395,7 @@
 </p:sld>
 </file>
 
-<file path=ppt/slides/slide12.xml><?xml version="1.0" encoding="utf-8"?>
+<file path=ppt/slides/slide13.xml><?xml version="1.0" encoding="utf-8"?>
 <p:sld xmlns:a="http://schemas.openxmlformats.org/drawingml/2006/main" xmlns:r="http://schemas.openxmlformats.org/officeDocument/2006/relationships" xmlns:p="http://schemas.openxmlformats.org/presentationml/2006/main">
   <p:cSld>
     <p:spTree>
@@ -7306,9 +7437,6 @@
               <a:rPr lang="en-US" dirty="0"/>
               <a:t>implementation [ALEX AND SOLOMON]</a:t>
             </a:r>
-            <a:br>
-              <a:rPr lang="en-US" dirty="0"/>
-            </a:br>
             <a:endParaRPr lang="en-GB" dirty="0"/>
           </a:p>
         </p:txBody>
@@ -7387,7 +7515,7 @@
 </p:sld>
 </file>
 
-<file path=ppt/slides/slide13.xml><?xml version="1.0" encoding="utf-8"?>
+<file path=ppt/slides/slide14.xml><?xml version="1.0" encoding="utf-8"?>
 <p:sld xmlns:a="http://schemas.openxmlformats.org/drawingml/2006/main" xmlns:r="http://schemas.openxmlformats.org/officeDocument/2006/relationships" xmlns:p="http://schemas.openxmlformats.org/presentationml/2006/main">
   <p:cSld>
     <p:spTree>
@@ -7507,7 +7635,7 @@
 </p:sld>
 </file>
 
-<file path=ppt/slides/slide14.xml><?xml version="1.0" encoding="utf-8"?>
+<file path=ppt/slides/slide15.xml><?xml version="1.0" encoding="utf-8"?>
 <p:sld xmlns:a="http://schemas.openxmlformats.org/drawingml/2006/main" xmlns:r="http://schemas.openxmlformats.org/officeDocument/2006/relationships" xmlns:p="http://schemas.openxmlformats.org/presentationml/2006/main">
   <p:cSld>
     <p:spTree>
@@ -7627,7 +7755,7 @@
 </p:sld>
 </file>
 
-<file path=ppt/slides/slide15.xml><?xml version="1.0" encoding="utf-8"?>
+<file path=ppt/slides/slide16.xml><?xml version="1.0" encoding="utf-8"?>
 <p:sld xmlns:a="http://schemas.openxmlformats.org/drawingml/2006/main" xmlns:r="http://schemas.openxmlformats.org/officeDocument/2006/relationships" xmlns:p="http://schemas.openxmlformats.org/presentationml/2006/main">
   <p:cSld>
     <p:spTree>
@@ -7750,7 +7878,7 @@
 </p:sld>
 </file>
 
-<file path=ppt/slides/slide16.xml><?xml version="1.0" encoding="utf-8"?>
+<file path=ppt/slides/slide17.xml><?xml version="1.0" encoding="utf-8"?>
 <p:sld xmlns:a="http://schemas.openxmlformats.org/drawingml/2006/main" xmlns:r="http://schemas.openxmlformats.org/officeDocument/2006/relationships" xmlns:p="http://schemas.openxmlformats.org/presentationml/2006/main">
   <p:cSld>
     <p:spTree>
@@ -7870,7 +7998,7 @@
 </p:sld>
 </file>
 
-<file path=ppt/slides/slide17.xml><?xml version="1.0" encoding="utf-8"?>
+<file path=ppt/slides/slide18.xml><?xml version="1.0" encoding="utf-8"?>
 <p:sld xmlns:a="http://schemas.openxmlformats.org/drawingml/2006/main" xmlns:r="http://schemas.openxmlformats.org/officeDocument/2006/relationships" xmlns:p="http://schemas.openxmlformats.org/presentationml/2006/main">
   <p:cSld>
     <p:spTree>
@@ -7909,7 +8037,7 @@
           <a:lstStyle/>
           <a:p>
             <a:r>
-              <a:rPr lang="en-US" dirty="0"/>
+              <a:rPr lang="en-US"/>
               <a:t>links</a:t>
             </a:r>
             <a:endParaRPr lang="en-GB" dirty="0"/>
@@ -7941,268 +8069,12 @@
           </a:p>
         </p:txBody>
       </p:sp>
-    </p:spTree>
-    <p:extLst>
-      <p:ext uri="{BB962C8B-B14F-4D97-AF65-F5344CB8AC3E}">
-        <p14:creationId xmlns:p14="http://schemas.microsoft.com/office/powerpoint/2010/main" val="724613322"/>
-      </p:ext>
-    </p:extLst>
-  </p:cSld>
-  <p:clrMapOvr>
-    <a:masterClrMapping/>
-  </p:clrMapOvr>
-</p:sld>
-</file>
-
-<file path=ppt/slides/slide2.xml><?xml version="1.0" encoding="utf-8"?>
-<p:sld xmlns:a="http://schemas.openxmlformats.org/drawingml/2006/main" xmlns:r="http://schemas.openxmlformats.org/officeDocument/2006/relationships" xmlns:p="http://schemas.openxmlformats.org/presentationml/2006/main">
-  <p:cSld>
-    <p:bg>
-      <p:bgPr>
-        <a:solidFill>
-          <a:schemeClr val="bg1"/>
-        </a:solidFill>
-        <a:effectLst/>
-      </p:bgPr>
-    </p:bg>
-    <p:spTree>
-      <p:nvGrpSpPr>
-        <p:cNvPr id="1" name=""/>
-        <p:cNvGrpSpPr/>
-        <p:nvPr/>
-      </p:nvGrpSpPr>
-      <p:grpSpPr>
-        <a:xfrm>
-          <a:off x="0" y="0"/>
-          <a:ext cx="0" cy="0"/>
-          <a:chOff x="0" y="0"/>
-          <a:chExt cx="0" cy="0"/>
-        </a:xfrm>
-      </p:grpSpPr>
-      <p:sp>
-        <p:nvSpPr>
-          <p:cNvPr id="8" name="Rectangle 7">
+      <p:pic>
+        <p:nvPicPr>
+          <p:cNvPr id="4" name="Picture 3" descr="A picture containing drawing&#10;&#10;Description automatically generated">
             <a:extLst>
               <a:ext uri="{FF2B5EF4-FFF2-40B4-BE49-F238E27FC236}">
-                <a16:creationId xmlns:a16="http://schemas.microsoft.com/office/drawing/2014/main" id="{1A6D86F0-98E0-4468-9315-41BF7B0F2E68}"/>
-              </a:ext>
-              <a:ext uri="{C183D7F6-B498-43B3-948B-1728B52AA6E4}">
-                <adec:decorative xmlns:adec="http://schemas.microsoft.com/office/drawing/2017/decorative" val="1"/>
-              </a:ext>
-            </a:extLst>
-          </p:cNvPr>
-          <p:cNvSpPr>
-            <a:spLocks noGrp="1" noRot="1" noChangeAspect="1" noMove="1" noResize="1" noEditPoints="1" noAdjustHandles="1" noChangeArrowheads="1" noChangeShapeType="1" noTextEdit="1"/>
-          </p:cNvSpPr>
-          <p:nvPr>
-            <p:extLst>
-              <p:ext uri="{386F3935-93C4-4BCD-93E2-E3B085C9AB24}">
-                <p16:designElem xmlns:p16="http://schemas.microsoft.com/office/powerpoint/2015/main" val="1"/>
-              </p:ext>
-            </p:extLst>
-          </p:nvPr>
-        </p:nvSpPr>
-        <p:spPr>
-          <a:xfrm>
-            <a:off x="0" y="0"/>
-            <a:ext cx="4654296" cy="6858000"/>
-          </a:xfrm>
-          <a:prstGeom prst="rect">
-            <a:avLst/>
-          </a:prstGeom>
-          <a:solidFill>
-            <a:schemeClr val="tx2"/>
-          </a:solidFill>
-          <a:ln>
-            <a:noFill/>
-          </a:ln>
-        </p:spPr>
-        <p:style>
-          <a:lnRef idx="2">
-            <a:schemeClr val="accent1">
-              <a:shade val="50000"/>
-            </a:schemeClr>
-          </a:lnRef>
-          <a:fillRef idx="1">
-            <a:schemeClr val="accent1"/>
-          </a:fillRef>
-          <a:effectRef idx="0">
-            <a:schemeClr val="accent1"/>
-          </a:effectRef>
-          <a:fontRef idx="minor">
-            <a:schemeClr val="lt1"/>
-          </a:fontRef>
-        </p:style>
-        <p:txBody>
-          <a:bodyPr rtlCol="0" anchor="ctr"/>
-          <a:lstStyle/>
-          <a:p>
-            <a:pPr algn="ctr"/>
-            <a:endParaRPr lang="en-US"/>
-          </a:p>
-        </p:txBody>
-      </p:sp>
-      <p:sp>
-        <p:nvSpPr>
-          <p:cNvPr id="2" name="Title 1">
-            <a:extLst>
-              <a:ext uri="{FF2B5EF4-FFF2-40B4-BE49-F238E27FC236}">
-                <a16:creationId xmlns:a16="http://schemas.microsoft.com/office/drawing/2014/main" id="{242AAF47-7888-478B-96F0-BEB85F97CDA6}"/>
-              </a:ext>
-            </a:extLst>
-          </p:cNvPr>
-          <p:cNvSpPr>
-            <a:spLocks noGrp="1"/>
-          </p:cNvSpPr>
-          <p:nvPr>
-            <p:ph type="title"/>
-          </p:nvPr>
-        </p:nvSpPr>
-        <p:spPr>
-          <a:xfrm>
-            <a:off x="622570" y="838646"/>
-            <a:ext cx="3709991" cy="5180709"/>
-          </a:xfrm>
-        </p:spPr>
-        <p:txBody>
-          <a:bodyPr>
-            <a:normAutofit/>
-          </a:bodyPr>
-          <a:lstStyle/>
-          <a:p>
-            <a:r>
-              <a:rPr lang="en-US" sz="3600"/>
-              <a:t>Team role introductions - Zack</a:t>
-            </a:r>
-            <a:endParaRPr lang="en-GB" sz="3600"/>
-          </a:p>
-        </p:txBody>
-      </p:sp>
-      <p:sp useBgFill="1">
-        <p:nvSpPr>
-          <p:cNvPr id="10" name="Rectangle 9">
-            <a:extLst>
-              <a:ext uri="{FF2B5EF4-FFF2-40B4-BE49-F238E27FC236}">
-                <a16:creationId xmlns:a16="http://schemas.microsoft.com/office/drawing/2014/main" id="{CE957058-57AD-46A9-BAE9-7145CB3504F9}"/>
-              </a:ext>
-              <a:ext uri="{C183D7F6-B498-43B3-948B-1728B52AA6E4}">
-                <adec:decorative xmlns:adec="http://schemas.microsoft.com/office/drawing/2017/decorative" val="1"/>
-              </a:ext>
-            </a:extLst>
-          </p:cNvPr>
-          <p:cNvSpPr>
-            <a:spLocks noGrp="1" noRot="1" noChangeAspect="1" noMove="1" noResize="1" noEditPoints="1" noAdjustHandles="1" noChangeArrowheads="1" noChangeShapeType="1" noTextEdit="1"/>
-          </p:cNvSpPr>
-          <p:nvPr>
-            <p:extLst>
-              <p:ext uri="{386F3935-93C4-4BCD-93E2-E3B085C9AB24}">
-                <p16:designElem xmlns:p16="http://schemas.microsoft.com/office/powerpoint/2015/main" val="1"/>
-              </p:ext>
-            </p:extLst>
-          </p:nvPr>
-        </p:nvSpPr>
-        <p:spPr>
-          <a:xfrm>
-            <a:off x="4654295" y="-2"/>
-            <a:ext cx="7537703" cy="6858002"/>
-          </a:xfrm>
-          <a:prstGeom prst="rect">
-            <a:avLst/>
-          </a:prstGeom>
-          <a:ln>
-            <a:noFill/>
-          </a:ln>
-        </p:spPr>
-        <p:style>
-          <a:lnRef idx="2">
-            <a:schemeClr val="accent1">
-              <a:shade val="50000"/>
-            </a:schemeClr>
-          </a:lnRef>
-          <a:fillRef idx="1">
-            <a:schemeClr val="accent1"/>
-          </a:fillRef>
-          <a:effectRef idx="0">
-            <a:schemeClr val="accent1"/>
-          </a:effectRef>
-          <a:fontRef idx="minor">
-            <a:schemeClr val="lt1"/>
-          </a:fontRef>
-        </p:style>
-        <p:txBody>
-          <a:bodyPr rtlCol="0" anchor="ctr"/>
-          <a:lstStyle/>
-          <a:p>
-            <a:pPr algn="ctr"/>
-            <a:endParaRPr lang="en-US"/>
-          </a:p>
-        </p:txBody>
-      </p:sp>
-      <p:sp>
-        <p:nvSpPr>
-          <p:cNvPr id="3" name="Content Placeholder 2">
-            <a:extLst>
-              <a:ext uri="{FF2B5EF4-FFF2-40B4-BE49-F238E27FC236}">
-                <a16:creationId xmlns:a16="http://schemas.microsoft.com/office/drawing/2014/main" id="{471CCB88-6F1D-47AA-8042-15BB4B335CD2}"/>
-              </a:ext>
-            </a:extLst>
-          </p:cNvPr>
-          <p:cNvSpPr>
-            <a:spLocks noGrp="1"/>
-          </p:cNvSpPr>
-          <p:nvPr>
-            <p:ph idx="1"/>
-          </p:nvPr>
-        </p:nvSpPr>
-        <p:spPr>
-          <a:xfrm>
-            <a:off x="5163671" y="838647"/>
-            <a:ext cx="5823328" cy="5180708"/>
-          </a:xfrm>
-        </p:spPr>
-        <p:txBody>
-          <a:bodyPr anchor="ctr">
-            <a:normAutofit/>
-          </a:bodyPr>
-          <a:lstStyle/>
-          <a:p>
-            <a:r>
-              <a:rPr lang="en-US" sz="2000" dirty="0">
-                <a:solidFill>
-                  <a:schemeClr val="tx2"/>
-                </a:solidFill>
-              </a:rPr>
-              <a:t>-Mug shot</a:t>
-            </a:r>
-          </a:p>
-          <a:p>
-            <a:r>
-              <a:rPr lang="en-US" sz="2000" dirty="0">
-                <a:solidFill>
-                  <a:schemeClr val="tx2"/>
-                </a:solidFill>
-              </a:rPr>
-              <a:t>Primary and secondary roles</a:t>
-            </a:r>
-          </a:p>
-          <a:p>
-            <a:pPr marL="0" indent="0">
-              <a:buNone/>
-            </a:pPr>
-            <a:endParaRPr lang="en-GB" sz="2000" dirty="0">
-              <a:solidFill>
-                <a:schemeClr val="tx2"/>
-              </a:solidFill>
-            </a:endParaRPr>
-          </a:p>
-        </p:txBody>
-      </p:sp>
-      <p:pic>
-        <p:nvPicPr>
-          <p:cNvPr id="6" name="Picture 5" descr="A picture containing drawing&#10;&#10;Description automatically generated">
-            <a:extLst>
-              <a:ext uri="{FF2B5EF4-FFF2-40B4-BE49-F238E27FC236}">
-                <a16:creationId xmlns:a16="http://schemas.microsoft.com/office/drawing/2014/main" id="{B0E9BDB5-DE26-407A-AE6C-E41B6BC86758}"/>
+                <a16:creationId xmlns:a16="http://schemas.microsoft.com/office/drawing/2014/main" id="{839C6121-12AD-D849-A561-4A9B2C0D3ABA}"/>
               </a:ext>
             </a:extLst>
           </p:cNvPr>
@@ -8225,7 +8097,7 @@
         </p:blipFill>
         <p:spPr>
           <a:xfrm>
-            <a:off x="0" y="-23639"/>
+            <a:off x="10588487" y="284176"/>
             <a:ext cx="1506507" cy="1506507"/>
           </a:xfrm>
           <a:prstGeom prst="rect">
@@ -8236,23 +8108,23 @@
     </p:spTree>
     <p:extLst>
       <p:ext uri="{BB962C8B-B14F-4D97-AF65-F5344CB8AC3E}">
-        <p14:creationId xmlns:p14="http://schemas.microsoft.com/office/powerpoint/2010/main" val="2008343651"/>
+        <p14:creationId xmlns:p14="http://schemas.microsoft.com/office/powerpoint/2010/main" val="724613322"/>
       </p:ext>
     </p:extLst>
   </p:cSld>
   <p:clrMapOvr>
-    <a:overrideClrMapping bg1="lt1" tx1="dk1" bg2="lt2" tx2="dk2" accent1="accent1" accent2="accent2" accent3="accent3" accent4="accent4" accent5="accent5" accent6="accent6" hlink="hlink" folHlink="folHlink"/>
+    <a:masterClrMapping/>
   </p:clrMapOvr>
 </p:sld>
 </file>
 
-<file path=ppt/slides/slide3.xml><?xml version="1.0" encoding="utf-8"?>
+<file path=ppt/slides/slide2.xml><?xml version="1.0" encoding="utf-8"?>
 <p:sld xmlns:a="http://schemas.openxmlformats.org/drawingml/2006/main" xmlns:r="http://schemas.openxmlformats.org/officeDocument/2006/relationships" xmlns:p="http://schemas.openxmlformats.org/presentationml/2006/main">
   <p:cSld>
     <p:bg>
       <p:bgPr>
         <a:solidFill>
-          <a:schemeClr val="bg1"/>
+          <a:schemeClr val="bg2"/>
         </a:solidFill>
         <a:effectLst/>
       </p:bgPr>
@@ -8273,10 +8145,10 @@
       </p:grpSpPr>
       <p:sp>
         <p:nvSpPr>
-          <p:cNvPr id="8" name="Rectangle 7">
+          <p:cNvPr id="80" name="Rectangle 73">
             <a:extLst>
               <a:ext uri="{FF2B5EF4-FFF2-40B4-BE49-F238E27FC236}">
-                <a16:creationId xmlns:a16="http://schemas.microsoft.com/office/drawing/2014/main" id="{1A6D86F0-98E0-4468-9315-41BF7B0F2E68}"/>
+                <a16:creationId xmlns:a16="http://schemas.microsoft.com/office/drawing/2014/main" id="{5F9F5EB8-AB42-47FD-8F4A-176C0A4B1B0A}"/>
               </a:ext>
               <a:ext uri="{C183D7F6-B498-43B3-948B-1728B52AA6E4}">
                 <adec:decorative xmlns:adec="http://schemas.microsoft.com/office/drawing/2017/decorative" val="1"/>
@@ -8296,14 +8168,14 @@
         </p:nvSpPr>
         <p:spPr>
           <a:xfrm>
-            <a:off x="0" y="0"/>
-            <a:ext cx="4654296" cy="6858000"/>
+            <a:off x="3048" y="2059012"/>
+            <a:ext cx="12188952" cy="1828800"/>
           </a:xfrm>
           <a:prstGeom prst="rect">
             <a:avLst/>
           </a:prstGeom>
           <a:solidFill>
-            <a:schemeClr val="tx2"/>
+            <a:schemeClr val="tx1"/>
           </a:solidFill>
           <a:ln>
             <a:noFill/>
@@ -8325,57 +8197,13 @@
             <a:schemeClr val="lt1"/>
           </a:fontRef>
         </p:style>
-        <p:txBody>
-          <a:bodyPr rtlCol="0" anchor="ctr"/>
-          <a:lstStyle/>
-          <a:p>
-            <a:pPr algn="ctr"/>
-            <a:endParaRPr lang="en-US"/>
-          </a:p>
-        </p:txBody>
-      </p:sp>
-      <p:sp>
-        <p:nvSpPr>
-          <p:cNvPr id="2" name="Title 1">
+      </p:sp>
+      <p:sp useBgFill="1">
+        <p:nvSpPr>
+          <p:cNvPr id="81" name="Rectangle 75">
             <a:extLst>
               <a:ext uri="{FF2B5EF4-FFF2-40B4-BE49-F238E27FC236}">
-                <a16:creationId xmlns:a16="http://schemas.microsoft.com/office/drawing/2014/main" id="{242AAF47-7888-478B-96F0-BEB85F97CDA6}"/>
-              </a:ext>
-            </a:extLst>
-          </p:cNvPr>
-          <p:cNvSpPr>
-            <a:spLocks noGrp="1"/>
-          </p:cNvSpPr>
-          <p:nvPr>
-            <p:ph type="title"/>
-          </p:nvPr>
-        </p:nvSpPr>
-        <p:spPr>
-          <a:xfrm>
-            <a:off x="622570" y="838646"/>
-            <a:ext cx="3709991" cy="5180709"/>
-          </a:xfrm>
-        </p:spPr>
-        <p:txBody>
-          <a:bodyPr>
-            <a:normAutofit/>
-          </a:bodyPr>
-          <a:lstStyle/>
-          <a:p>
-            <a:r>
-              <a:rPr lang="en-US" sz="3600" dirty="0"/>
-              <a:t>Team role introductions - josie</a:t>
-            </a:r>
-            <a:endParaRPr lang="en-GB" sz="3600" dirty="0"/>
-          </a:p>
-        </p:txBody>
-      </p:sp>
-      <p:sp useBgFill="1">
-        <p:nvSpPr>
-          <p:cNvPr id="10" name="Rectangle 9">
-            <a:extLst>
-              <a:ext uri="{FF2B5EF4-FFF2-40B4-BE49-F238E27FC236}">
-                <a16:creationId xmlns:a16="http://schemas.microsoft.com/office/drawing/2014/main" id="{CE957058-57AD-46A9-BAE9-7145CB3504F9}"/>
+                <a16:creationId xmlns:a16="http://schemas.microsoft.com/office/drawing/2014/main" id="{F5D04095-82A0-4203-9728-B32227226818}"/>
               </a:ext>
               <a:ext uri="{C183D7F6-B498-43B3-948B-1728B52AA6E4}">
                 <adec:decorative xmlns:adec="http://schemas.microsoft.com/office/drawing/2017/decorative" val="1"/>
@@ -8395,8 +8223,8 @@
         </p:nvSpPr>
         <p:spPr>
           <a:xfrm>
-            <a:off x="4654295" y="-2"/>
-            <a:ext cx="7537703" cy="6858002"/>
+            <a:off x="0" y="0"/>
+            <a:ext cx="12192000" cy="6858000"/>
           </a:xfrm>
           <a:prstGeom prst="rect">
             <a:avLst/>
@@ -8411,8 +8239,8 @@
               <a:shade val="50000"/>
             </a:schemeClr>
           </a:lnRef>
-          <a:fillRef idx="1">
-            <a:schemeClr val="accent1"/>
+          <a:fillRef idx="1001">
+            <a:schemeClr val="dk2"/>
           </a:fillRef>
           <a:effectRef idx="0">
             <a:schemeClr val="accent1"/>
@@ -8426,72 +8254,16 @@
           <a:lstStyle/>
           <a:p>
             <a:pPr algn="ctr"/>
-            <a:endParaRPr lang="en-US"/>
-          </a:p>
-        </p:txBody>
-      </p:sp>
-      <p:sp>
-        <p:nvSpPr>
-          <p:cNvPr id="3" name="Content Placeholder 2">
+            <a:endParaRPr lang="en-US" dirty="0"/>
+          </a:p>
+        </p:txBody>
+      </p:sp>
+      <p:pic>
+        <p:nvPicPr>
+          <p:cNvPr id="60" name="Graphic 59" descr="Users">
             <a:extLst>
               <a:ext uri="{FF2B5EF4-FFF2-40B4-BE49-F238E27FC236}">
-                <a16:creationId xmlns:a16="http://schemas.microsoft.com/office/drawing/2014/main" id="{471CCB88-6F1D-47AA-8042-15BB4B335CD2}"/>
-              </a:ext>
-            </a:extLst>
-          </p:cNvPr>
-          <p:cNvSpPr>
-            <a:spLocks noGrp="1"/>
-          </p:cNvSpPr>
-          <p:nvPr>
-            <p:ph idx="1"/>
-          </p:nvPr>
-        </p:nvSpPr>
-        <p:spPr>
-          <a:xfrm>
-            <a:off x="5163671" y="838647"/>
-            <a:ext cx="5823328" cy="5180708"/>
-          </a:xfrm>
-        </p:spPr>
-        <p:txBody>
-          <a:bodyPr anchor="ctr">
-            <a:normAutofit/>
-          </a:bodyPr>
-          <a:lstStyle/>
-          <a:p>
-            <a:r>
-              <a:rPr lang="en-US" sz="2000" dirty="0">
-                <a:solidFill>
-                  <a:schemeClr val="tx2"/>
-                </a:solidFill>
-              </a:rPr>
-              <a:t>-Mug shot</a:t>
-            </a:r>
-          </a:p>
-          <a:p>
-            <a:r>
-              <a:rPr lang="en-US" sz="2000" dirty="0">
-                <a:solidFill>
-                  <a:schemeClr val="tx2"/>
-                </a:solidFill>
-              </a:rPr>
-              <a:t>Primary and secondary roles</a:t>
-            </a:r>
-          </a:p>
-          <a:p>
-            <a:endParaRPr lang="en-GB" sz="2000" dirty="0">
-              <a:solidFill>
-                <a:schemeClr val="tx2"/>
-              </a:solidFill>
-            </a:endParaRPr>
-          </a:p>
-        </p:txBody>
-      </p:sp>
-      <p:pic>
-        <p:nvPicPr>
-          <p:cNvPr id="6" name="Picture 5" descr="A picture containing drawing&#10;&#10;Description automatically generated">
-            <a:extLst>
-              <a:ext uri="{FF2B5EF4-FFF2-40B4-BE49-F238E27FC236}">
-                <a16:creationId xmlns:a16="http://schemas.microsoft.com/office/drawing/2014/main" id="{3F35C615-30F3-43F1-888E-75D9E2438A69}"/>
+                <a16:creationId xmlns:a16="http://schemas.microsoft.com/office/drawing/2014/main" id="{FB4E85AE-7356-403C-BF18-77F4768B46C8}"/>
               </a:ext>
             </a:extLst>
           </p:cNvPr>
@@ -8506,6 +8278,9 @@
               <a:ext uri="{28A0092B-C50C-407E-A947-70E740481C1C}">
                 <a14:useLocalDpi xmlns:a14="http://schemas.microsoft.com/office/drawing/2010/main" val="0"/>
               </a:ext>
+              <a:ext uri="{96DAC541-7B7A-43D3-8B79-37D633B846F1}">
+                <asvg:svgBlip xmlns:asvg="http://schemas.microsoft.com/office/drawing/2016/SVG/main" r:embed="rId3"/>
+              </a:ext>
             </a:extLst>
           </a:blip>
           <a:stretch>
@@ -8514,58 +8289,20 @@
         </p:blipFill>
         <p:spPr>
           <a:xfrm>
-            <a:off x="0" y="-23639"/>
-            <a:ext cx="1506507" cy="1506507"/>
+            <a:off x="4743246" y="461365"/>
+            <a:ext cx="2702459" cy="2702459"/>
           </a:xfrm>
           <a:prstGeom prst="rect">
             <a:avLst/>
           </a:prstGeom>
         </p:spPr>
       </p:pic>
-    </p:spTree>
-    <p:extLst>
-      <p:ext uri="{BB962C8B-B14F-4D97-AF65-F5344CB8AC3E}">
-        <p14:creationId xmlns:p14="http://schemas.microsoft.com/office/powerpoint/2010/main" val="1217038663"/>
-      </p:ext>
-    </p:extLst>
-  </p:cSld>
-  <p:clrMapOvr>
-    <a:overrideClrMapping bg1="lt1" tx1="dk1" bg2="lt2" tx2="dk2" accent1="accent1" accent2="accent2" accent3="accent3" accent4="accent4" accent5="accent5" accent6="accent6" hlink="hlink" folHlink="folHlink"/>
-  </p:clrMapOvr>
-</p:sld>
-</file>
-
-<file path=ppt/slides/slide4.xml><?xml version="1.0" encoding="utf-8"?>
-<p:sld xmlns:a="http://schemas.openxmlformats.org/drawingml/2006/main" xmlns:r="http://schemas.openxmlformats.org/officeDocument/2006/relationships" xmlns:p="http://schemas.openxmlformats.org/presentationml/2006/main">
-  <p:cSld>
-    <p:bg>
-      <p:bgPr>
-        <a:solidFill>
-          <a:schemeClr val="bg1"/>
-        </a:solidFill>
-        <a:effectLst/>
-      </p:bgPr>
-    </p:bg>
-    <p:spTree>
-      <p:nvGrpSpPr>
-        <p:cNvPr id="1" name=""/>
-        <p:cNvGrpSpPr/>
-        <p:nvPr/>
-      </p:nvGrpSpPr>
-      <p:grpSpPr>
-        <a:xfrm>
-          <a:off x="0" y="0"/>
-          <a:ext cx="0" cy="0"/>
-          <a:chOff x="0" y="0"/>
-          <a:chExt cx="0" cy="0"/>
-        </a:xfrm>
-      </p:grpSpPr>
-      <p:sp>
-        <p:nvSpPr>
-          <p:cNvPr id="8" name="Rectangle 7">
+      <p:sp>
+        <p:nvSpPr>
+          <p:cNvPr id="82" name="Rectangle 77">
             <a:extLst>
               <a:ext uri="{FF2B5EF4-FFF2-40B4-BE49-F238E27FC236}">
-                <a16:creationId xmlns:a16="http://schemas.microsoft.com/office/drawing/2014/main" id="{1A6D86F0-98E0-4468-9315-41BF7B0F2E68}"/>
+                <a16:creationId xmlns:a16="http://schemas.microsoft.com/office/drawing/2014/main" id="{F6775829-84CA-4765-8BE1-88A69E91D940}"/>
               </a:ext>
               <a:ext uri="{C183D7F6-B498-43B3-948B-1728B52AA6E4}">
                 <adec:decorative xmlns:adec="http://schemas.microsoft.com/office/drawing/2017/decorative" val="1"/>
@@ -8585,14 +8322,14 @@
         </p:nvSpPr>
         <p:spPr>
           <a:xfrm>
-            <a:off x="0" y="0"/>
-            <a:ext cx="4654296" cy="6858000"/>
+            <a:off x="3048" y="3657600"/>
+            <a:ext cx="12188952" cy="1828800"/>
           </a:xfrm>
           <a:prstGeom prst="rect">
             <a:avLst/>
           </a:prstGeom>
           <a:solidFill>
-            <a:schemeClr val="tx2"/>
+            <a:schemeClr val="tx1"/>
           </a:solidFill>
           <a:ln>
             <a:noFill/>
@@ -8616,10 +8353,108 @@
         </p:style>
         <p:txBody>
           <a:bodyPr rtlCol="0" anchor="ctr"/>
-          <a:lstStyle/>
+          <a:lstStyle>
+            <a:defPPr>
+              <a:defRPr lang="en-US"/>
+            </a:defPPr>
+            <a:lvl1pPr marL="0" algn="l" defTabSz="914400" rtl="0" eaLnBrk="1" latinLnBrk="0" hangingPunct="1">
+              <a:defRPr sz="1800" kern="1200">
+                <a:solidFill>
+                  <a:schemeClr val="lt1"/>
+                </a:solidFill>
+                <a:latin typeface="+mn-lt"/>
+                <a:ea typeface="+mn-ea"/>
+                <a:cs typeface="+mn-cs"/>
+              </a:defRPr>
+            </a:lvl1pPr>
+            <a:lvl2pPr marL="457200" algn="l" defTabSz="914400" rtl="0" eaLnBrk="1" latinLnBrk="0" hangingPunct="1">
+              <a:defRPr sz="1800" kern="1200">
+                <a:solidFill>
+                  <a:schemeClr val="lt1"/>
+                </a:solidFill>
+                <a:latin typeface="+mn-lt"/>
+                <a:ea typeface="+mn-ea"/>
+                <a:cs typeface="+mn-cs"/>
+              </a:defRPr>
+            </a:lvl2pPr>
+            <a:lvl3pPr marL="914400" algn="l" defTabSz="914400" rtl="0" eaLnBrk="1" latinLnBrk="0" hangingPunct="1">
+              <a:defRPr sz="1800" kern="1200">
+                <a:solidFill>
+                  <a:schemeClr val="lt1"/>
+                </a:solidFill>
+                <a:latin typeface="+mn-lt"/>
+                <a:ea typeface="+mn-ea"/>
+                <a:cs typeface="+mn-cs"/>
+              </a:defRPr>
+            </a:lvl3pPr>
+            <a:lvl4pPr marL="1371600" algn="l" defTabSz="914400" rtl="0" eaLnBrk="1" latinLnBrk="0" hangingPunct="1">
+              <a:defRPr sz="1800" kern="1200">
+                <a:solidFill>
+                  <a:schemeClr val="lt1"/>
+                </a:solidFill>
+                <a:latin typeface="+mn-lt"/>
+                <a:ea typeface="+mn-ea"/>
+                <a:cs typeface="+mn-cs"/>
+              </a:defRPr>
+            </a:lvl4pPr>
+            <a:lvl5pPr marL="1828800" algn="l" defTabSz="914400" rtl="0" eaLnBrk="1" latinLnBrk="0" hangingPunct="1">
+              <a:defRPr sz="1800" kern="1200">
+                <a:solidFill>
+                  <a:schemeClr val="lt1"/>
+                </a:solidFill>
+                <a:latin typeface="+mn-lt"/>
+                <a:ea typeface="+mn-ea"/>
+                <a:cs typeface="+mn-cs"/>
+              </a:defRPr>
+            </a:lvl5pPr>
+            <a:lvl6pPr marL="2286000" algn="l" defTabSz="914400" rtl="0" eaLnBrk="1" latinLnBrk="0" hangingPunct="1">
+              <a:defRPr sz="1800" kern="1200">
+                <a:solidFill>
+                  <a:schemeClr val="lt1"/>
+                </a:solidFill>
+                <a:latin typeface="+mn-lt"/>
+                <a:ea typeface="+mn-ea"/>
+                <a:cs typeface="+mn-cs"/>
+              </a:defRPr>
+            </a:lvl6pPr>
+            <a:lvl7pPr marL="2743200" algn="l" defTabSz="914400" rtl="0" eaLnBrk="1" latinLnBrk="0" hangingPunct="1">
+              <a:defRPr sz="1800" kern="1200">
+                <a:solidFill>
+                  <a:schemeClr val="lt1"/>
+                </a:solidFill>
+                <a:latin typeface="+mn-lt"/>
+                <a:ea typeface="+mn-ea"/>
+                <a:cs typeface="+mn-cs"/>
+              </a:defRPr>
+            </a:lvl7pPr>
+            <a:lvl8pPr marL="3200400" algn="l" defTabSz="914400" rtl="0" eaLnBrk="1" latinLnBrk="0" hangingPunct="1">
+              <a:defRPr sz="1800" kern="1200">
+                <a:solidFill>
+                  <a:schemeClr val="lt1"/>
+                </a:solidFill>
+                <a:latin typeface="+mn-lt"/>
+                <a:ea typeface="+mn-ea"/>
+                <a:cs typeface="+mn-cs"/>
+              </a:defRPr>
+            </a:lvl8pPr>
+            <a:lvl9pPr marL="3657600" algn="l" defTabSz="914400" rtl="0" eaLnBrk="1" latinLnBrk="0" hangingPunct="1">
+              <a:defRPr sz="1800" kern="1200">
+                <a:solidFill>
+                  <a:schemeClr val="lt1"/>
+                </a:solidFill>
+                <a:latin typeface="+mn-lt"/>
+                <a:ea typeface="+mn-ea"/>
+                <a:cs typeface="+mn-cs"/>
+              </a:defRPr>
+            </a:lvl9pPr>
+          </a:lstStyle>
           <a:p>
             <a:pPr algn="ctr"/>
-            <a:endParaRPr lang="en-US"/>
+            <a:endParaRPr lang="en-US" dirty="0">
+              <a:solidFill>
+                <a:srgbClr val="FFFFFF"/>
+              </a:solidFill>
+            </a:endParaRPr>
           </a:p>
         </p:txBody>
       </p:sp>
@@ -8628,7 +8463,7 @@
           <p:cNvPr id="2" name="Title 1">
             <a:extLst>
               <a:ext uri="{FF2B5EF4-FFF2-40B4-BE49-F238E27FC236}">
-                <a16:creationId xmlns:a16="http://schemas.microsoft.com/office/drawing/2014/main" id="{242AAF47-7888-478B-96F0-BEB85F97CDA6}"/>
+                <a16:creationId xmlns:a16="http://schemas.microsoft.com/office/drawing/2014/main" id="{B146FBB2-EF63-1C4A-9711-9AE698FA7DDE}"/>
               </a:ext>
             </a:extLst>
           </p:cNvPr>
@@ -8641,200 +8476,48 @@
         </p:nvSpPr>
         <p:spPr>
           <a:xfrm>
-            <a:off x="622570" y="838646"/>
-            <a:ext cx="3709991" cy="5180709"/>
+            <a:off x="365759" y="3794760"/>
+            <a:ext cx="11471565" cy="1739347"/>
           </a:xfrm>
         </p:spPr>
         <p:txBody>
-          <a:bodyPr>
+          <a:bodyPr vert="horz" lIns="91440" tIns="45720" rIns="91440" bIns="45720" rtlCol="0" anchor="ctr">
             <a:normAutofit/>
           </a:bodyPr>
           <a:lstStyle/>
           <a:p>
+            <a:pPr algn="ctr">
+              <a:lnSpc>
+                <a:spcPct val="80000"/>
+              </a:lnSpc>
+            </a:pPr>
             <a:r>
-              <a:rPr lang="en-US" sz="3600" dirty="0"/>
-              <a:t>Team role introductions - </a:t>
+              <a:rPr lang="en-US" sz="6000" spc="150"/>
+              <a:t>TEAM ROLE INTRODUCTIONS</a:t>
             </a:r>
-            <a:r>
-              <a:rPr lang="en-US" sz="3600" dirty="0" err="1"/>
-              <a:t>alex</a:t>
-            </a:r>
-            <a:endParaRPr lang="en-GB" sz="3600" dirty="0"/>
-          </a:p>
-        </p:txBody>
-      </p:sp>
-      <p:sp useBgFill="1">
-        <p:nvSpPr>
-          <p:cNvPr id="10" name="Rectangle 9">
-            <a:extLst>
-              <a:ext uri="{FF2B5EF4-FFF2-40B4-BE49-F238E27FC236}">
-                <a16:creationId xmlns:a16="http://schemas.microsoft.com/office/drawing/2014/main" id="{CE957058-57AD-46A9-BAE9-7145CB3504F9}"/>
-              </a:ext>
-              <a:ext uri="{C183D7F6-B498-43B3-948B-1728B52AA6E4}">
-                <adec:decorative xmlns:adec="http://schemas.microsoft.com/office/drawing/2017/decorative" val="1"/>
-              </a:ext>
-            </a:extLst>
-          </p:cNvPr>
-          <p:cNvSpPr>
-            <a:spLocks noGrp="1" noRot="1" noChangeAspect="1" noMove="1" noResize="1" noEditPoints="1" noAdjustHandles="1" noChangeArrowheads="1" noChangeShapeType="1" noTextEdit="1"/>
-          </p:cNvSpPr>
-          <p:nvPr>
-            <p:extLst>
-              <p:ext uri="{386F3935-93C4-4BCD-93E2-E3B085C9AB24}">
-                <p16:designElem xmlns:p16="http://schemas.microsoft.com/office/powerpoint/2015/main" val="1"/>
-              </p:ext>
-            </p:extLst>
-          </p:nvPr>
-        </p:nvSpPr>
-        <p:spPr>
-          <a:xfrm>
-            <a:off x="4654295" y="-2"/>
-            <a:ext cx="7537703" cy="6858002"/>
-          </a:xfrm>
-          <a:prstGeom prst="rect">
-            <a:avLst/>
-          </a:prstGeom>
-          <a:ln>
-            <a:noFill/>
-          </a:ln>
-        </p:spPr>
-        <p:style>
-          <a:lnRef idx="2">
-            <a:schemeClr val="accent1">
-              <a:shade val="50000"/>
-            </a:schemeClr>
-          </a:lnRef>
-          <a:fillRef idx="1">
-            <a:schemeClr val="accent1"/>
-          </a:fillRef>
-          <a:effectRef idx="0">
-            <a:schemeClr val="accent1"/>
-          </a:effectRef>
-          <a:fontRef idx="minor">
-            <a:schemeClr val="lt1"/>
-          </a:fontRef>
-        </p:style>
-        <p:txBody>
-          <a:bodyPr rtlCol="0" anchor="ctr"/>
-          <a:lstStyle/>
-          <a:p>
-            <a:pPr algn="ctr"/>
-            <a:endParaRPr lang="en-US"/>
-          </a:p>
-        </p:txBody>
-      </p:sp>
-      <p:sp>
-        <p:nvSpPr>
-          <p:cNvPr id="3" name="Content Placeholder 2">
-            <a:extLst>
-              <a:ext uri="{FF2B5EF4-FFF2-40B4-BE49-F238E27FC236}">
-                <a16:creationId xmlns:a16="http://schemas.microsoft.com/office/drawing/2014/main" id="{471CCB88-6F1D-47AA-8042-15BB4B335CD2}"/>
-              </a:ext>
-            </a:extLst>
-          </p:cNvPr>
-          <p:cNvSpPr>
-            <a:spLocks noGrp="1"/>
-          </p:cNvSpPr>
-          <p:nvPr>
-            <p:ph idx="1"/>
-          </p:nvPr>
-        </p:nvSpPr>
-        <p:spPr>
-          <a:xfrm>
-            <a:off x="5163671" y="838647"/>
-            <a:ext cx="5823328" cy="5180708"/>
-          </a:xfrm>
-        </p:spPr>
-        <p:txBody>
-          <a:bodyPr anchor="ctr">
-            <a:normAutofit/>
-          </a:bodyPr>
-          <a:lstStyle/>
-          <a:p>
-            <a:r>
-              <a:rPr lang="en-US" sz="2000" dirty="0">
-                <a:solidFill>
-                  <a:schemeClr val="tx2"/>
-                </a:solidFill>
-              </a:rPr>
-              <a:t>-Mug shot</a:t>
-            </a:r>
-          </a:p>
-          <a:p>
-            <a:r>
-              <a:rPr lang="en-US" sz="2000" dirty="0">
-                <a:solidFill>
-                  <a:schemeClr val="tx2"/>
-                </a:solidFill>
-              </a:rPr>
-              <a:t>Primary and secondary roles</a:t>
-            </a:r>
-          </a:p>
-          <a:p>
-            <a:endParaRPr lang="en-GB" sz="2000" dirty="0">
-              <a:solidFill>
-                <a:schemeClr val="tx2"/>
-              </a:solidFill>
-            </a:endParaRPr>
-          </a:p>
-        </p:txBody>
-      </p:sp>
-      <p:pic>
-        <p:nvPicPr>
-          <p:cNvPr id="6" name="Picture 5" descr="A picture containing drawing&#10;&#10;Description automatically generated">
-            <a:extLst>
-              <a:ext uri="{FF2B5EF4-FFF2-40B4-BE49-F238E27FC236}">
-                <a16:creationId xmlns:a16="http://schemas.microsoft.com/office/drawing/2014/main" id="{430991FC-D000-4AA6-A9C3-0875854E3B4A}"/>
-              </a:ext>
-            </a:extLst>
-          </p:cNvPr>
-          <p:cNvPicPr>
-            <a:picLocks noChangeAspect="1"/>
-          </p:cNvPicPr>
-          <p:nvPr/>
-        </p:nvPicPr>
-        <p:blipFill>
-          <a:blip r:embed="rId2">
-            <a:extLst>
-              <a:ext uri="{28A0092B-C50C-407E-A947-70E740481C1C}">
-                <a14:useLocalDpi xmlns:a14="http://schemas.microsoft.com/office/drawing/2010/main" val="0"/>
-              </a:ext>
-            </a:extLst>
-          </a:blip>
-          <a:stretch>
-            <a:fillRect/>
-          </a:stretch>
-        </p:blipFill>
-        <p:spPr>
-          <a:xfrm>
-            <a:off x="0" y="-23639"/>
-            <a:ext cx="1506507" cy="1506507"/>
-          </a:xfrm>
-          <a:prstGeom prst="rect">
-            <a:avLst/>
-          </a:prstGeom>
-        </p:spPr>
-      </p:pic>
+          </a:p>
+        </p:txBody>
+      </p:sp>
     </p:spTree>
     <p:extLst>
       <p:ext uri="{BB962C8B-B14F-4D97-AF65-F5344CB8AC3E}">
-        <p14:creationId xmlns:p14="http://schemas.microsoft.com/office/powerpoint/2010/main" val="3333649028"/>
+        <p14:creationId xmlns:p14="http://schemas.microsoft.com/office/powerpoint/2010/main" val="1152158538"/>
       </p:ext>
     </p:extLst>
   </p:cSld>
   <p:clrMapOvr>
-    <a:overrideClrMapping bg1="lt1" tx1="dk1" bg2="lt2" tx2="dk2" accent1="accent1" accent2="accent2" accent3="accent3" accent4="accent4" accent5="accent5" accent6="accent6" hlink="hlink" folHlink="folHlink"/>
+    <a:masterClrMapping/>
   </p:clrMapOvr>
 </p:sld>
 </file>
 
-<file path=ppt/slides/slide5.xml><?xml version="1.0" encoding="utf-8"?>
+<file path=ppt/slides/slide3.xml><?xml version="1.0" encoding="utf-8"?>
 <p:sld xmlns:a="http://schemas.openxmlformats.org/drawingml/2006/main" xmlns:r="http://schemas.openxmlformats.org/officeDocument/2006/relationships" xmlns:p="http://schemas.openxmlformats.org/presentationml/2006/main">
   <p:cSld>
     <p:bg>
       <p:bgPr>
         <a:solidFill>
-          <a:schemeClr val="bg1"/>
+          <a:schemeClr val="bg2"/>
         </a:solidFill>
         <a:effectLst/>
       </p:bgPr>
@@ -8855,10 +8538,10 @@
       </p:grpSpPr>
       <p:sp>
         <p:nvSpPr>
-          <p:cNvPr id="8" name="Rectangle 7">
+          <p:cNvPr id="68" name="Rectangle 63">
             <a:extLst>
               <a:ext uri="{FF2B5EF4-FFF2-40B4-BE49-F238E27FC236}">
-                <a16:creationId xmlns:a16="http://schemas.microsoft.com/office/drawing/2014/main" id="{1A6D86F0-98E0-4468-9315-41BF7B0F2E68}"/>
+                <a16:creationId xmlns:a16="http://schemas.microsoft.com/office/drawing/2014/main" id="{53FD8994-38E8-4E51-9444-3447A171944C}"/>
               </a:ext>
               <a:ext uri="{C183D7F6-B498-43B3-948B-1728B52AA6E4}">
                 <adec:decorative xmlns:adec="http://schemas.microsoft.com/office/drawing/2017/decorative" val="1"/>
@@ -8879,13 +8562,75 @@
         <p:spPr>
           <a:xfrm>
             <a:off x="0" y="0"/>
-            <a:ext cx="4654296" cy="6858000"/>
+            <a:ext cx="6125497" cy="6858000"/>
+          </a:xfrm>
+          <a:prstGeom prst="rect">
+            <a:avLst/>
+          </a:prstGeom>
+          <a:ln>
+            <a:noFill/>
+          </a:ln>
+        </p:spPr>
+        <p:style>
+          <a:lnRef idx="2">
+            <a:schemeClr val="accent1">
+              <a:shade val="50000"/>
+            </a:schemeClr>
+          </a:lnRef>
+          <a:fillRef idx="1001">
+            <a:schemeClr val="lt1"/>
+          </a:fillRef>
+          <a:effectRef idx="0">
+            <a:schemeClr val="accent1"/>
+          </a:effectRef>
+          <a:fontRef idx="minor">
+            <a:schemeClr val="lt1"/>
+          </a:fontRef>
+        </p:style>
+        <p:txBody>
+          <a:bodyPr rtlCol="0" anchor="ctr"/>
+          <a:lstStyle/>
+          <a:p>
+            <a:pPr algn="ctr"/>
+            <a:endParaRPr lang="en-US" dirty="0"/>
+          </a:p>
+        </p:txBody>
+      </p:sp>
+      <p:sp>
+        <p:nvSpPr>
+          <p:cNvPr id="69" name="Rectangle 65">
+            <a:extLst>
+              <a:ext uri="{FF2B5EF4-FFF2-40B4-BE49-F238E27FC236}">
+                <a16:creationId xmlns:a16="http://schemas.microsoft.com/office/drawing/2014/main" id="{F71673FE-0587-4591-8D3B-D7F7345E8ACC}"/>
+              </a:ext>
+              <a:ext uri="{C183D7F6-B498-43B3-948B-1728B52AA6E4}">
+                <adec:decorative xmlns:adec="http://schemas.microsoft.com/office/drawing/2017/decorative" val="1"/>
+              </a:ext>
+            </a:extLst>
+          </p:cNvPr>
+          <p:cNvSpPr>
+            <a:spLocks noGrp="1" noRot="1" noChangeAspect="1" noMove="1" noResize="1" noEditPoints="1" noAdjustHandles="1" noChangeArrowheads="1" noChangeShapeType="1" noTextEdit="1"/>
+          </p:cNvSpPr>
+          <p:nvPr>
+            <p:extLst>
+              <p:ext uri="{386F3935-93C4-4BCD-93E2-E3B085C9AB24}">
+                <p16:designElem xmlns:p16="http://schemas.microsoft.com/office/powerpoint/2015/main" val="1"/>
+              </p:ext>
+            </p:extLst>
+          </p:nvPr>
+        </p:nvSpPr>
+        <p:spPr>
+          <a:xfrm>
+            <a:off x="6129910" y="176109"/>
+            <a:ext cx="6059524" cy="1645919"/>
           </a:xfrm>
           <a:prstGeom prst="rect">
             <a:avLst/>
           </a:prstGeom>
           <a:solidFill>
-            <a:schemeClr val="tx2"/>
+            <a:schemeClr val="tx1">
+              <a:alpha val="95000"/>
+            </a:schemeClr>
           </a:solidFill>
           <a:ln>
             <a:noFill/>
@@ -8909,10 +8654,108 @@
         </p:style>
         <p:txBody>
           <a:bodyPr rtlCol="0" anchor="ctr"/>
-          <a:lstStyle/>
+          <a:lstStyle>
+            <a:defPPr>
+              <a:defRPr lang="en-US"/>
+            </a:defPPr>
+            <a:lvl1pPr marL="0" algn="l" defTabSz="914400" rtl="0" eaLnBrk="1" latinLnBrk="0" hangingPunct="1">
+              <a:defRPr sz="1800" kern="1200">
+                <a:solidFill>
+                  <a:schemeClr val="lt1"/>
+                </a:solidFill>
+                <a:latin typeface="+mn-lt"/>
+                <a:ea typeface="+mn-ea"/>
+                <a:cs typeface="+mn-cs"/>
+              </a:defRPr>
+            </a:lvl1pPr>
+            <a:lvl2pPr marL="457200" algn="l" defTabSz="914400" rtl="0" eaLnBrk="1" latinLnBrk="0" hangingPunct="1">
+              <a:defRPr sz="1800" kern="1200">
+                <a:solidFill>
+                  <a:schemeClr val="lt1"/>
+                </a:solidFill>
+                <a:latin typeface="+mn-lt"/>
+                <a:ea typeface="+mn-ea"/>
+                <a:cs typeface="+mn-cs"/>
+              </a:defRPr>
+            </a:lvl2pPr>
+            <a:lvl3pPr marL="914400" algn="l" defTabSz="914400" rtl="0" eaLnBrk="1" latinLnBrk="0" hangingPunct="1">
+              <a:defRPr sz="1800" kern="1200">
+                <a:solidFill>
+                  <a:schemeClr val="lt1"/>
+                </a:solidFill>
+                <a:latin typeface="+mn-lt"/>
+                <a:ea typeface="+mn-ea"/>
+                <a:cs typeface="+mn-cs"/>
+              </a:defRPr>
+            </a:lvl3pPr>
+            <a:lvl4pPr marL="1371600" algn="l" defTabSz="914400" rtl="0" eaLnBrk="1" latinLnBrk="0" hangingPunct="1">
+              <a:defRPr sz="1800" kern="1200">
+                <a:solidFill>
+                  <a:schemeClr val="lt1"/>
+                </a:solidFill>
+                <a:latin typeface="+mn-lt"/>
+                <a:ea typeface="+mn-ea"/>
+                <a:cs typeface="+mn-cs"/>
+              </a:defRPr>
+            </a:lvl4pPr>
+            <a:lvl5pPr marL="1828800" algn="l" defTabSz="914400" rtl="0" eaLnBrk="1" latinLnBrk="0" hangingPunct="1">
+              <a:defRPr sz="1800" kern="1200">
+                <a:solidFill>
+                  <a:schemeClr val="lt1"/>
+                </a:solidFill>
+                <a:latin typeface="+mn-lt"/>
+                <a:ea typeface="+mn-ea"/>
+                <a:cs typeface="+mn-cs"/>
+              </a:defRPr>
+            </a:lvl5pPr>
+            <a:lvl6pPr marL="2286000" algn="l" defTabSz="914400" rtl="0" eaLnBrk="1" latinLnBrk="0" hangingPunct="1">
+              <a:defRPr sz="1800" kern="1200">
+                <a:solidFill>
+                  <a:schemeClr val="lt1"/>
+                </a:solidFill>
+                <a:latin typeface="+mn-lt"/>
+                <a:ea typeface="+mn-ea"/>
+                <a:cs typeface="+mn-cs"/>
+              </a:defRPr>
+            </a:lvl6pPr>
+            <a:lvl7pPr marL="2743200" algn="l" defTabSz="914400" rtl="0" eaLnBrk="1" latinLnBrk="0" hangingPunct="1">
+              <a:defRPr sz="1800" kern="1200">
+                <a:solidFill>
+                  <a:schemeClr val="lt1"/>
+                </a:solidFill>
+                <a:latin typeface="+mn-lt"/>
+                <a:ea typeface="+mn-ea"/>
+                <a:cs typeface="+mn-cs"/>
+              </a:defRPr>
+            </a:lvl7pPr>
+            <a:lvl8pPr marL="3200400" algn="l" defTabSz="914400" rtl="0" eaLnBrk="1" latinLnBrk="0" hangingPunct="1">
+              <a:defRPr sz="1800" kern="1200">
+                <a:solidFill>
+                  <a:schemeClr val="lt1"/>
+                </a:solidFill>
+                <a:latin typeface="+mn-lt"/>
+                <a:ea typeface="+mn-ea"/>
+                <a:cs typeface="+mn-cs"/>
+              </a:defRPr>
+            </a:lvl8pPr>
+            <a:lvl9pPr marL="3657600" algn="l" defTabSz="914400" rtl="0" eaLnBrk="1" latinLnBrk="0" hangingPunct="1">
+              <a:defRPr sz="1800" kern="1200">
+                <a:solidFill>
+                  <a:schemeClr val="lt1"/>
+                </a:solidFill>
+                <a:latin typeface="+mn-lt"/>
+                <a:ea typeface="+mn-ea"/>
+                <a:cs typeface="+mn-cs"/>
+              </a:defRPr>
+            </a:lvl9pPr>
+          </a:lstStyle>
           <a:p>
             <a:pPr algn="ctr"/>
-            <a:endParaRPr lang="en-US"/>
+            <a:endParaRPr lang="en-US" dirty="0">
+              <a:solidFill>
+                <a:srgbClr val="FFFFFF"/>
+              </a:solidFill>
+            </a:endParaRPr>
           </a:p>
         </p:txBody>
       </p:sp>
@@ -8934,8 +8777,8 @@
         </p:nvSpPr>
         <p:spPr>
           <a:xfrm>
-            <a:off x="622570" y="838646"/>
-            <a:ext cx="3709991" cy="5180709"/>
+            <a:off x="6449961" y="284176"/>
+            <a:ext cx="5094980" cy="1508760"/>
           </a:xfrm>
         </p:spPr>
         <p:txBody>
@@ -8945,30 +8788,267 @@
           <a:lstStyle/>
           <a:p>
             <a:r>
-              <a:rPr lang="en-US" sz="3600" dirty="0"/>
-              <a:t>Team role introductions</a:t>
+              <a:rPr lang="en-US"/>
+              <a:t>Zack</a:t>
             </a:r>
-            <a:br>
-              <a:rPr lang="en-US" sz="3600" dirty="0"/>
-            </a:br>
-            <a:r>
-              <a:rPr lang="en-US" sz="3600" dirty="0"/>
-              <a:t>- </a:t>
-            </a:r>
-            <a:r>
-              <a:rPr lang="en-US" sz="3600" dirty="0" err="1"/>
-              <a:t>solomon</a:t>
-            </a:r>
-            <a:endParaRPr lang="en-GB" sz="3600" dirty="0"/>
-          </a:p>
-        </p:txBody>
-      </p:sp>
-      <p:sp useBgFill="1">
-        <p:nvSpPr>
-          <p:cNvPr id="10" name="Rectangle 9">
+            <a:endParaRPr lang="en-GB" dirty="0"/>
+          </a:p>
+        </p:txBody>
+      </p:sp>
+      <p:sp>
+        <p:nvSpPr>
+          <p:cNvPr id="3" name="Content Placeholder 2">
             <a:extLst>
               <a:ext uri="{FF2B5EF4-FFF2-40B4-BE49-F238E27FC236}">
-                <a16:creationId xmlns:a16="http://schemas.microsoft.com/office/drawing/2014/main" id="{CE957058-57AD-46A9-BAE9-7145CB3504F9}"/>
+                <a16:creationId xmlns:a16="http://schemas.microsoft.com/office/drawing/2014/main" id="{471CCB88-6F1D-47AA-8042-15BB4B335CD2}"/>
+              </a:ext>
+            </a:extLst>
+          </p:cNvPr>
+          <p:cNvSpPr>
+            <a:spLocks noGrp="1"/>
+          </p:cNvSpPr>
+          <p:nvPr>
+            <p:ph idx="1"/>
+          </p:nvPr>
+        </p:nvSpPr>
+        <p:spPr>
+          <a:xfrm>
+            <a:off x="6454363" y="2011680"/>
+            <a:ext cx="5090578" cy="4206240"/>
+          </a:xfrm>
+        </p:spPr>
+        <p:txBody>
+          <a:bodyPr>
+            <a:normAutofit/>
+          </a:bodyPr>
+          <a:lstStyle/>
+          <a:p>
+            <a:pPr marL="0" indent="0">
+              <a:buNone/>
+            </a:pPr>
+            <a:r>
+              <a:rPr lang="en-US"/>
+              <a:t>Primary Role:</a:t>
+            </a:r>
+          </a:p>
+          <a:p>
+            <a:r>
+              <a:rPr lang="en-US"/>
+              <a:t>Product Owner</a:t>
+            </a:r>
+          </a:p>
+          <a:p>
+            <a:endParaRPr lang="en-US"/>
+          </a:p>
+          <a:p>
+            <a:pPr marL="0" indent="0">
+              <a:buNone/>
+            </a:pPr>
+            <a:r>
+              <a:rPr lang="en-US"/>
+              <a:t>Secondary Role(s):</a:t>
+            </a:r>
+          </a:p>
+          <a:p>
+            <a:r>
+              <a:rPr lang="en-US"/>
+              <a:t>Secondary Designer</a:t>
+            </a:r>
+          </a:p>
+          <a:p>
+            <a:r>
+              <a:rPr lang="en-US"/>
+              <a:t>Client Liason</a:t>
+            </a:r>
+          </a:p>
+          <a:p>
+            <a:endParaRPr lang="en-GB"/>
+          </a:p>
+        </p:txBody>
+      </p:sp>
+      <p:sp>
+        <p:nvSpPr>
+          <p:cNvPr id="7" name="TextBox 6">
+            <a:extLst>
+              <a:ext uri="{FF2B5EF4-FFF2-40B4-BE49-F238E27FC236}">
+                <a16:creationId xmlns:a16="http://schemas.microsoft.com/office/drawing/2014/main" id="{C06EABB7-F1A6-9A48-9ABF-EA1D3903213B}"/>
+              </a:ext>
+            </a:extLst>
+          </p:cNvPr>
+          <p:cNvSpPr txBox="1"/>
+          <p:nvPr/>
+        </p:nvSpPr>
+        <p:spPr>
+          <a:xfrm>
+            <a:off x="9879724" y="1902372"/>
+            <a:ext cx="184731" cy="369332"/>
+          </a:xfrm>
+          <a:prstGeom prst="rect">
+            <a:avLst/>
+          </a:prstGeom>
+          <a:noFill/>
+        </p:spPr>
+        <p:txBody>
+          <a:bodyPr wrap="none" rtlCol="0">
+            <a:spAutoFit/>
+          </a:bodyPr>
+          <a:lstStyle/>
+          <a:p>
+            <a:endParaRPr lang="en-US" dirty="0"/>
+          </a:p>
+        </p:txBody>
+      </p:sp>
+    </p:spTree>
+    <p:extLst>
+      <p:ext uri="{BB962C8B-B14F-4D97-AF65-F5344CB8AC3E}">
+        <p14:creationId xmlns:p14="http://schemas.microsoft.com/office/powerpoint/2010/main" val="3333649028"/>
+      </p:ext>
+    </p:extLst>
+  </p:cSld>
+  <p:clrMapOvr>
+    <a:masterClrMapping/>
+  </p:clrMapOvr>
+</p:sld>
+</file>
+
+<file path=ppt/slides/slide4.xml><?xml version="1.0" encoding="utf-8"?>
+<p:sld xmlns:a="http://schemas.openxmlformats.org/drawingml/2006/main" xmlns:r="http://schemas.openxmlformats.org/officeDocument/2006/relationships" xmlns:p="http://schemas.openxmlformats.org/presentationml/2006/main">
+  <p:cSld>
+    <p:bg>
+      <p:bgPr>
+        <a:solidFill>
+          <a:schemeClr val="bg2"/>
+        </a:solidFill>
+        <a:effectLst/>
+      </p:bgPr>
+    </p:bg>
+    <p:spTree>
+      <p:nvGrpSpPr>
+        <p:cNvPr id="1" name=""/>
+        <p:cNvGrpSpPr/>
+        <p:nvPr/>
+      </p:nvGrpSpPr>
+      <p:grpSpPr>
+        <a:xfrm>
+          <a:off x="0" y="0"/>
+          <a:ext cx="0" cy="0"/>
+          <a:chOff x="0" y="0"/>
+          <a:chExt cx="0" cy="0"/>
+        </a:xfrm>
+      </p:grpSpPr>
+      <p:sp>
+        <p:nvSpPr>
+          <p:cNvPr id="2" name="Title 1">
+            <a:extLst>
+              <a:ext uri="{FF2B5EF4-FFF2-40B4-BE49-F238E27FC236}">
+                <a16:creationId xmlns:a16="http://schemas.microsoft.com/office/drawing/2014/main" id="{242AAF47-7888-478B-96F0-BEB85F97CDA6}"/>
+              </a:ext>
+            </a:extLst>
+          </p:cNvPr>
+          <p:cNvSpPr>
+            <a:spLocks noGrp="1"/>
+          </p:cNvSpPr>
+          <p:nvPr>
+            <p:ph type="title"/>
+          </p:nvPr>
+        </p:nvSpPr>
+        <p:spPr>
+          <a:xfrm>
+            <a:off x="634277" y="284176"/>
+            <a:ext cx="3670874" cy="1508760"/>
+          </a:xfrm>
+        </p:spPr>
+        <p:txBody>
+          <a:bodyPr>
+            <a:normAutofit/>
+          </a:bodyPr>
+          <a:lstStyle/>
+          <a:p>
+            <a:r>
+              <a:rPr lang="en-US"/>
+              <a:t>Josie</a:t>
+            </a:r>
+            <a:endParaRPr lang="en-GB"/>
+          </a:p>
+        </p:txBody>
+      </p:sp>
+      <p:sp>
+        <p:nvSpPr>
+          <p:cNvPr id="3" name="Content Placeholder 2">
+            <a:extLst>
+              <a:ext uri="{FF2B5EF4-FFF2-40B4-BE49-F238E27FC236}">
+                <a16:creationId xmlns:a16="http://schemas.microsoft.com/office/drawing/2014/main" id="{471CCB88-6F1D-47AA-8042-15BB4B335CD2}"/>
+              </a:ext>
+            </a:extLst>
+          </p:cNvPr>
+          <p:cNvSpPr>
+            <a:spLocks noGrp="1"/>
+          </p:cNvSpPr>
+          <p:nvPr>
+            <p:ph idx="1"/>
+          </p:nvPr>
+        </p:nvSpPr>
+        <p:spPr>
+          <a:xfrm>
+            <a:off x="634277" y="2011680"/>
+            <a:ext cx="3676678" cy="4206240"/>
+          </a:xfrm>
+        </p:spPr>
+        <p:txBody>
+          <a:bodyPr>
+            <a:normAutofit/>
+          </a:bodyPr>
+          <a:lstStyle/>
+          <a:p>
+            <a:pPr marL="0" indent="0">
+              <a:buNone/>
+            </a:pPr>
+            <a:r>
+              <a:rPr lang="en-US"/>
+              <a:t>Primary Role:</a:t>
+            </a:r>
+          </a:p>
+          <a:p>
+            <a:r>
+              <a:rPr lang="en-US"/>
+              <a:t>Scrum Master</a:t>
+            </a:r>
+          </a:p>
+          <a:p>
+            <a:endParaRPr lang="en-US"/>
+          </a:p>
+          <a:p>
+            <a:pPr marL="0" indent="0">
+              <a:buNone/>
+            </a:pPr>
+            <a:r>
+              <a:rPr lang="en-US"/>
+              <a:t>Secondary Role(s):</a:t>
+            </a:r>
+          </a:p>
+          <a:p>
+            <a:r>
+              <a:rPr lang="en-US"/>
+              <a:t>Lead Designer</a:t>
+            </a:r>
+          </a:p>
+          <a:p>
+            <a:r>
+              <a:rPr lang="en-US"/>
+              <a:t>QA Tester</a:t>
+            </a:r>
+          </a:p>
+          <a:p>
+            <a:endParaRPr lang="en-GB"/>
+          </a:p>
+        </p:txBody>
+      </p:sp>
+      <p:sp>
+        <p:nvSpPr>
+          <p:cNvPr id="67" name="Rectangle 62">
+            <a:extLst>
+              <a:ext uri="{FF2B5EF4-FFF2-40B4-BE49-F238E27FC236}">
+                <a16:creationId xmlns:a16="http://schemas.microsoft.com/office/drawing/2014/main" id="{94DBFBD2-23B9-4007-B82F-D0C394407024}"/>
               </a:ext>
               <a:ext uri="{C183D7F6-B498-43B3-948B-1728B52AA6E4}">
                 <adec:decorative xmlns:adec="http://schemas.microsoft.com/office/drawing/2017/decorative" val="1"/>
@@ -8988,12 +9068,210 @@
         </p:nvSpPr>
         <p:spPr>
           <a:xfrm>
-            <a:off x="4654295" y="-2"/>
-            <a:ext cx="7537703" cy="6858002"/>
+            <a:off x="4625190" y="0"/>
+            <a:ext cx="7566810" cy="6858000"/>
           </a:xfrm>
           <a:prstGeom prst="rect">
             <a:avLst/>
           </a:prstGeom>
+          <a:solidFill>
+            <a:schemeClr val="tx1"/>
+          </a:solidFill>
+          <a:ln>
+            <a:noFill/>
+          </a:ln>
+        </p:spPr>
+        <p:style>
+          <a:lnRef idx="2">
+            <a:schemeClr val="accent1">
+              <a:shade val="50000"/>
+            </a:schemeClr>
+          </a:lnRef>
+          <a:fillRef idx="1001">
+            <a:schemeClr val="lt1"/>
+          </a:fillRef>
+          <a:effectRef idx="0">
+            <a:schemeClr val="accent1"/>
+          </a:effectRef>
+          <a:fontRef idx="minor">
+            <a:schemeClr val="lt1"/>
+          </a:fontRef>
+        </p:style>
+        <p:txBody>
+          <a:bodyPr rtlCol="0" anchor="ctr"/>
+          <a:lstStyle/>
+          <a:p>
+            <a:pPr algn="ctr"/>
+            <a:endParaRPr lang="en-US" dirty="0"/>
+          </a:p>
+        </p:txBody>
+      </p:sp>
+      <p:sp>
+        <p:nvSpPr>
+          <p:cNvPr id="7" name="TextBox 6">
+            <a:extLst>
+              <a:ext uri="{FF2B5EF4-FFF2-40B4-BE49-F238E27FC236}">
+                <a16:creationId xmlns:a16="http://schemas.microsoft.com/office/drawing/2014/main" id="{C06EABB7-F1A6-9A48-9ABF-EA1D3903213B}"/>
+              </a:ext>
+            </a:extLst>
+          </p:cNvPr>
+          <p:cNvSpPr txBox="1"/>
+          <p:nvPr/>
+        </p:nvSpPr>
+        <p:spPr>
+          <a:xfrm>
+            <a:off x="9879724" y="1902372"/>
+            <a:ext cx="184731" cy="369332"/>
+          </a:xfrm>
+          <a:prstGeom prst="rect">
+            <a:avLst/>
+          </a:prstGeom>
+          <a:noFill/>
+        </p:spPr>
+        <p:txBody>
+          <a:bodyPr wrap="none" rtlCol="0">
+            <a:spAutoFit/>
+          </a:bodyPr>
+          <a:lstStyle/>
+          <a:p>
+            <a:endParaRPr lang="en-US" dirty="0"/>
+          </a:p>
+        </p:txBody>
+      </p:sp>
+    </p:spTree>
+    <p:extLst>
+      <p:ext uri="{BB962C8B-B14F-4D97-AF65-F5344CB8AC3E}">
+        <p14:creationId xmlns:p14="http://schemas.microsoft.com/office/powerpoint/2010/main" val="3552337688"/>
+      </p:ext>
+    </p:extLst>
+  </p:cSld>
+  <p:clrMapOvr>
+    <a:masterClrMapping/>
+  </p:clrMapOvr>
+</p:sld>
+</file>
+
+<file path=ppt/slides/slide5.xml><?xml version="1.0" encoding="utf-8"?>
+<p:sld xmlns:a="http://schemas.openxmlformats.org/drawingml/2006/main" xmlns:r="http://schemas.openxmlformats.org/officeDocument/2006/relationships" xmlns:p="http://schemas.openxmlformats.org/presentationml/2006/main">
+  <p:cSld>
+    <p:bg>
+      <p:bgPr>
+        <a:solidFill>
+          <a:schemeClr val="bg2"/>
+        </a:solidFill>
+        <a:effectLst/>
+      </p:bgPr>
+    </p:bg>
+    <p:spTree>
+      <p:nvGrpSpPr>
+        <p:cNvPr id="1" name=""/>
+        <p:cNvGrpSpPr/>
+        <p:nvPr/>
+      </p:nvGrpSpPr>
+      <p:grpSpPr>
+        <a:xfrm>
+          <a:off x="0" y="0"/>
+          <a:ext cx="0" cy="0"/>
+          <a:chOff x="0" y="0"/>
+          <a:chExt cx="0" cy="0"/>
+        </a:xfrm>
+      </p:grpSpPr>
+      <p:sp>
+        <p:nvSpPr>
+          <p:cNvPr id="54" name="Rectangle 53">
+            <a:extLst>
+              <a:ext uri="{FF2B5EF4-FFF2-40B4-BE49-F238E27FC236}">
+                <a16:creationId xmlns:a16="http://schemas.microsoft.com/office/drawing/2014/main" id="{53FD8994-38E8-4E51-9444-3447A171944C}"/>
+              </a:ext>
+              <a:ext uri="{C183D7F6-B498-43B3-948B-1728B52AA6E4}">
+                <adec:decorative xmlns:adec="http://schemas.microsoft.com/office/drawing/2017/decorative" val="1"/>
+              </a:ext>
+            </a:extLst>
+          </p:cNvPr>
+          <p:cNvSpPr>
+            <a:spLocks noGrp="1" noRot="1" noChangeAspect="1" noMove="1" noResize="1" noEditPoints="1" noAdjustHandles="1" noChangeArrowheads="1" noChangeShapeType="1" noTextEdit="1"/>
+          </p:cNvSpPr>
+          <p:nvPr>
+            <p:extLst>
+              <p:ext uri="{386F3935-93C4-4BCD-93E2-E3B085C9AB24}">
+                <p16:designElem xmlns:p16="http://schemas.microsoft.com/office/powerpoint/2015/main" val="1"/>
+              </p:ext>
+            </p:extLst>
+          </p:nvPr>
+        </p:nvSpPr>
+        <p:spPr>
+          <a:xfrm>
+            <a:off x="0" y="0"/>
+            <a:ext cx="6125497" cy="6858000"/>
+          </a:xfrm>
+          <a:prstGeom prst="rect">
+            <a:avLst/>
+          </a:prstGeom>
+          <a:ln>
+            <a:noFill/>
+          </a:ln>
+        </p:spPr>
+        <p:style>
+          <a:lnRef idx="2">
+            <a:schemeClr val="accent1">
+              <a:shade val="50000"/>
+            </a:schemeClr>
+          </a:lnRef>
+          <a:fillRef idx="1001">
+            <a:schemeClr val="lt1"/>
+          </a:fillRef>
+          <a:effectRef idx="0">
+            <a:schemeClr val="accent1"/>
+          </a:effectRef>
+          <a:fontRef idx="minor">
+            <a:schemeClr val="lt1"/>
+          </a:fontRef>
+        </p:style>
+        <p:txBody>
+          <a:bodyPr rtlCol="0" anchor="ctr"/>
+          <a:lstStyle/>
+          <a:p>
+            <a:pPr algn="ctr"/>
+            <a:endParaRPr lang="en-US" dirty="0"/>
+          </a:p>
+        </p:txBody>
+      </p:sp>
+      <p:sp>
+        <p:nvSpPr>
+          <p:cNvPr id="56" name="Rectangle 55">
+            <a:extLst>
+              <a:ext uri="{FF2B5EF4-FFF2-40B4-BE49-F238E27FC236}">
+                <a16:creationId xmlns:a16="http://schemas.microsoft.com/office/drawing/2014/main" id="{F71673FE-0587-4591-8D3B-D7F7345E8ACC}"/>
+              </a:ext>
+              <a:ext uri="{C183D7F6-B498-43B3-948B-1728B52AA6E4}">
+                <adec:decorative xmlns:adec="http://schemas.microsoft.com/office/drawing/2017/decorative" val="1"/>
+              </a:ext>
+            </a:extLst>
+          </p:cNvPr>
+          <p:cNvSpPr>
+            <a:spLocks noGrp="1" noRot="1" noChangeAspect="1" noMove="1" noResize="1" noEditPoints="1" noAdjustHandles="1" noChangeArrowheads="1" noChangeShapeType="1" noTextEdit="1"/>
+          </p:cNvSpPr>
+          <p:nvPr>
+            <p:extLst>
+              <p:ext uri="{386F3935-93C4-4BCD-93E2-E3B085C9AB24}">
+                <p16:designElem xmlns:p16="http://schemas.microsoft.com/office/powerpoint/2015/main" val="1"/>
+              </p:ext>
+            </p:extLst>
+          </p:nvPr>
+        </p:nvSpPr>
+        <p:spPr>
+          <a:xfrm>
+            <a:off x="6129910" y="176109"/>
+            <a:ext cx="6059524" cy="1645919"/>
+          </a:xfrm>
+          <a:prstGeom prst="rect">
+            <a:avLst/>
+          </a:prstGeom>
+          <a:solidFill>
+            <a:schemeClr val="tx1">
+              <a:alpha val="95000"/>
+            </a:schemeClr>
+          </a:solidFill>
           <a:ln>
             <a:noFill/>
           </a:ln>
@@ -9016,19 +9294,117 @@
         </p:style>
         <p:txBody>
           <a:bodyPr rtlCol="0" anchor="ctr"/>
-          <a:lstStyle/>
+          <a:lstStyle>
+            <a:defPPr>
+              <a:defRPr lang="en-US"/>
+            </a:defPPr>
+            <a:lvl1pPr marL="0" algn="l" defTabSz="914400" rtl="0" eaLnBrk="1" latinLnBrk="0" hangingPunct="1">
+              <a:defRPr sz="1800" kern="1200">
+                <a:solidFill>
+                  <a:schemeClr val="lt1"/>
+                </a:solidFill>
+                <a:latin typeface="+mn-lt"/>
+                <a:ea typeface="+mn-ea"/>
+                <a:cs typeface="+mn-cs"/>
+              </a:defRPr>
+            </a:lvl1pPr>
+            <a:lvl2pPr marL="457200" algn="l" defTabSz="914400" rtl="0" eaLnBrk="1" latinLnBrk="0" hangingPunct="1">
+              <a:defRPr sz="1800" kern="1200">
+                <a:solidFill>
+                  <a:schemeClr val="lt1"/>
+                </a:solidFill>
+                <a:latin typeface="+mn-lt"/>
+                <a:ea typeface="+mn-ea"/>
+                <a:cs typeface="+mn-cs"/>
+              </a:defRPr>
+            </a:lvl2pPr>
+            <a:lvl3pPr marL="914400" algn="l" defTabSz="914400" rtl="0" eaLnBrk="1" latinLnBrk="0" hangingPunct="1">
+              <a:defRPr sz="1800" kern="1200">
+                <a:solidFill>
+                  <a:schemeClr val="lt1"/>
+                </a:solidFill>
+                <a:latin typeface="+mn-lt"/>
+                <a:ea typeface="+mn-ea"/>
+                <a:cs typeface="+mn-cs"/>
+              </a:defRPr>
+            </a:lvl3pPr>
+            <a:lvl4pPr marL="1371600" algn="l" defTabSz="914400" rtl="0" eaLnBrk="1" latinLnBrk="0" hangingPunct="1">
+              <a:defRPr sz="1800" kern="1200">
+                <a:solidFill>
+                  <a:schemeClr val="lt1"/>
+                </a:solidFill>
+                <a:latin typeface="+mn-lt"/>
+                <a:ea typeface="+mn-ea"/>
+                <a:cs typeface="+mn-cs"/>
+              </a:defRPr>
+            </a:lvl4pPr>
+            <a:lvl5pPr marL="1828800" algn="l" defTabSz="914400" rtl="0" eaLnBrk="1" latinLnBrk="0" hangingPunct="1">
+              <a:defRPr sz="1800" kern="1200">
+                <a:solidFill>
+                  <a:schemeClr val="lt1"/>
+                </a:solidFill>
+                <a:latin typeface="+mn-lt"/>
+                <a:ea typeface="+mn-ea"/>
+                <a:cs typeface="+mn-cs"/>
+              </a:defRPr>
+            </a:lvl5pPr>
+            <a:lvl6pPr marL="2286000" algn="l" defTabSz="914400" rtl="0" eaLnBrk="1" latinLnBrk="0" hangingPunct="1">
+              <a:defRPr sz="1800" kern="1200">
+                <a:solidFill>
+                  <a:schemeClr val="lt1"/>
+                </a:solidFill>
+                <a:latin typeface="+mn-lt"/>
+                <a:ea typeface="+mn-ea"/>
+                <a:cs typeface="+mn-cs"/>
+              </a:defRPr>
+            </a:lvl6pPr>
+            <a:lvl7pPr marL="2743200" algn="l" defTabSz="914400" rtl="0" eaLnBrk="1" latinLnBrk="0" hangingPunct="1">
+              <a:defRPr sz="1800" kern="1200">
+                <a:solidFill>
+                  <a:schemeClr val="lt1"/>
+                </a:solidFill>
+                <a:latin typeface="+mn-lt"/>
+                <a:ea typeface="+mn-ea"/>
+                <a:cs typeface="+mn-cs"/>
+              </a:defRPr>
+            </a:lvl7pPr>
+            <a:lvl8pPr marL="3200400" algn="l" defTabSz="914400" rtl="0" eaLnBrk="1" latinLnBrk="0" hangingPunct="1">
+              <a:defRPr sz="1800" kern="1200">
+                <a:solidFill>
+                  <a:schemeClr val="lt1"/>
+                </a:solidFill>
+                <a:latin typeface="+mn-lt"/>
+                <a:ea typeface="+mn-ea"/>
+                <a:cs typeface="+mn-cs"/>
+              </a:defRPr>
+            </a:lvl8pPr>
+            <a:lvl9pPr marL="3657600" algn="l" defTabSz="914400" rtl="0" eaLnBrk="1" latinLnBrk="0" hangingPunct="1">
+              <a:defRPr sz="1800" kern="1200">
+                <a:solidFill>
+                  <a:schemeClr val="lt1"/>
+                </a:solidFill>
+                <a:latin typeface="+mn-lt"/>
+                <a:ea typeface="+mn-ea"/>
+                <a:cs typeface="+mn-cs"/>
+              </a:defRPr>
+            </a:lvl9pPr>
+          </a:lstStyle>
           <a:p>
             <a:pPr algn="ctr"/>
-            <a:endParaRPr lang="en-US"/>
-          </a:p>
-        </p:txBody>
-      </p:sp>
-      <p:sp>
-        <p:nvSpPr>
-          <p:cNvPr id="3" name="Content Placeholder 2">
+            <a:endParaRPr lang="en-US" dirty="0">
+              <a:solidFill>
+                <a:srgbClr val="FFFFFF"/>
+              </a:solidFill>
+            </a:endParaRPr>
+          </a:p>
+        </p:txBody>
+      </p:sp>
+      <p:sp>
+        <p:nvSpPr>
+          <p:cNvPr id="2" name="Title 1">
             <a:extLst>
               <a:ext uri="{FF2B5EF4-FFF2-40B4-BE49-F238E27FC236}">
-                <a16:creationId xmlns:a16="http://schemas.microsoft.com/office/drawing/2014/main" id="{471CCB88-6F1D-47AA-8042-15BB4B335CD2}"/>
+                <a16:creationId xmlns:a16="http://schemas.microsoft.com/office/drawing/2014/main" id="{242AAF47-7888-478B-96F0-BEB85F97CDA6}"/>
               </a:ext>
             </a:extLst>
           </p:cNvPr>
@@ -9036,55 +9412,35 @@
             <a:spLocks noGrp="1"/>
           </p:cNvSpPr>
           <p:nvPr>
-            <p:ph idx="1"/>
+            <p:ph type="title"/>
           </p:nvPr>
         </p:nvSpPr>
         <p:spPr>
           <a:xfrm>
-            <a:off x="5163671" y="838647"/>
-            <a:ext cx="5823328" cy="5180708"/>
+            <a:off x="6449961" y="284176"/>
+            <a:ext cx="5094980" cy="1508760"/>
           </a:xfrm>
         </p:spPr>
         <p:txBody>
-          <a:bodyPr anchor="ctr">
+          <a:bodyPr>
             <a:normAutofit/>
           </a:bodyPr>
           <a:lstStyle/>
           <a:p>
             <a:r>
-              <a:rPr lang="en-US" sz="2000" dirty="0">
-                <a:solidFill>
-                  <a:schemeClr val="tx2"/>
-                </a:solidFill>
-              </a:rPr>
-              <a:t>-Mug shot</a:t>
+              <a:rPr lang="en-US"/>
+              <a:t>ALEX</a:t>
             </a:r>
-          </a:p>
-          <a:p>
-            <a:r>
-              <a:rPr lang="en-US" sz="2000" dirty="0">
-                <a:solidFill>
-                  <a:schemeClr val="tx2"/>
-                </a:solidFill>
-              </a:rPr>
-              <a:t>Primary and secondary roles</a:t>
-            </a:r>
-          </a:p>
-          <a:p>
-            <a:endParaRPr lang="en-GB" sz="2000" dirty="0">
-              <a:solidFill>
-                <a:schemeClr val="tx2"/>
-              </a:solidFill>
-            </a:endParaRPr>
+            <a:endParaRPr lang="en-GB"/>
           </a:p>
         </p:txBody>
       </p:sp>
       <p:pic>
         <p:nvPicPr>
-          <p:cNvPr id="6" name="Picture 5" descr="A picture containing drawing&#10;&#10;Description automatically generated">
+          <p:cNvPr id="5" name="Picture 4" descr="A person smiling for the camera&#10;&#10;Description automatically generated">
             <a:extLst>
               <a:ext uri="{FF2B5EF4-FFF2-40B4-BE49-F238E27FC236}">
-                <a16:creationId xmlns:a16="http://schemas.microsoft.com/office/drawing/2014/main" id="{5A70A6DB-3878-413C-A361-C13FEEEB03C5}"/>
+                <a16:creationId xmlns:a16="http://schemas.microsoft.com/office/drawing/2014/main" id="{A5218F41-AD27-DD42-9CE1-D8A453B176B6}"/>
               </a:ext>
             </a:extLst>
           </p:cNvPr>
@@ -9093,7 +9449,7 @@
           </p:cNvPicPr>
           <p:nvPr/>
         </p:nvPicPr>
-        <p:blipFill>
+        <p:blipFill rotWithShape="1">
           <a:blip r:embed="rId2">
             <a:extLst>
               <a:ext uri="{28A0092B-C50C-407E-A947-70E740481C1C}">
@@ -9101,20 +9457,330 @@
               </a:ext>
             </a:extLst>
           </a:blip>
-          <a:stretch>
-            <a:fillRect/>
-          </a:stretch>
+          <a:srcRect t="5471" r="-3" b="9968"/>
+          <a:stretch/>
         </p:blipFill>
         <p:spPr>
           <a:xfrm>
-            <a:off x="0" y="-23639"/>
-            <a:ext cx="1506507" cy="1506507"/>
+            <a:off x="634275" y="598634"/>
+            <a:ext cx="4851141" cy="5619286"/>
           </a:xfrm>
           <a:prstGeom prst="rect">
             <a:avLst/>
           </a:prstGeom>
         </p:spPr>
       </p:pic>
+      <p:sp>
+        <p:nvSpPr>
+          <p:cNvPr id="3" name="Content Placeholder 2">
+            <a:extLst>
+              <a:ext uri="{FF2B5EF4-FFF2-40B4-BE49-F238E27FC236}">
+                <a16:creationId xmlns:a16="http://schemas.microsoft.com/office/drawing/2014/main" id="{471CCB88-6F1D-47AA-8042-15BB4B335CD2}"/>
+              </a:ext>
+            </a:extLst>
+          </p:cNvPr>
+          <p:cNvSpPr>
+            <a:spLocks noGrp="1"/>
+          </p:cNvSpPr>
+          <p:nvPr>
+            <p:ph idx="1"/>
+          </p:nvPr>
+        </p:nvSpPr>
+        <p:spPr>
+          <a:xfrm>
+            <a:off x="6454363" y="2011680"/>
+            <a:ext cx="5090578" cy="4206240"/>
+          </a:xfrm>
+        </p:spPr>
+        <p:txBody>
+          <a:bodyPr>
+            <a:normAutofit/>
+          </a:bodyPr>
+          <a:lstStyle/>
+          <a:p>
+            <a:pPr marL="0" indent="0">
+              <a:buNone/>
+            </a:pPr>
+            <a:r>
+              <a:rPr lang="en-US"/>
+              <a:t>Primary Role:</a:t>
+            </a:r>
+          </a:p>
+          <a:p>
+            <a:r>
+              <a:rPr lang="en-US"/>
+              <a:t>Technical Lead</a:t>
+            </a:r>
+          </a:p>
+          <a:p>
+            <a:endParaRPr lang="en-US"/>
+          </a:p>
+          <a:p>
+            <a:pPr marL="0" indent="0">
+              <a:buNone/>
+            </a:pPr>
+            <a:r>
+              <a:rPr lang="en-US"/>
+              <a:t>Secondary Role(s):</a:t>
+            </a:r>
+          </a:p>
+          <a:p>
+            <a:r>
+              <a:rPr lang="en-US"/>
+              <a:t>Codebase Manager</a:t>
+            </a:r>
+          </a:p>
+          <a:p>
+            <a:r>
+              <a:rPr lang="en-US"/>
+              <a:t>QA Tester</a:t>
+            </a:r>
+          </a:p>
+          <a:p>
+            <a:endParaRPr lang="en-GB"/>
+          </a:p>
+        </p:txBody>
+      </p:sp>
+      <p:sp>
+        <p:nvSpPr>
+          <p:cNvPr id="7" name="TextBox 6">
+            <a:extLst>
+              <a:ext uri="{FF2B5EF4-FFF2-40B4-BE49-F238E27FC236}">
+                <a16:creationId xmlns:a16="http://schemas.microsoft.com/office/drawing/2014/main" id="{C06EABB7-F1A6-9A48-9ABF-EA1D3903213B}"/>
+              </a:ext>
+            </a:extLst>
+          </p:cNvPr>
+          <p:cNvSpPr txBox="1"/>
+          <p:nvPr/>
+        </p:nvSpPr>
+        <p:spPr>
+          <a:xfrm>
+            <a:off x="9879724" y="1902372"/>
+            <a:ext cx="184731" cy="369332"/>
+          </a:xfrm>
+          <a:prstGeom prst="rect">
+            <a:avLst/>
+          </a:prstGeom>
+          <a:noFill/>
+        </p:spPr>
+        <p:txBody>
+          <a:bodyPr wrap="none" rtlCol="0">
+            <a:spAutoFit/>
+          </a:bodyPr>
+          <a:lstStyle/>
+          <a:p>
+            <a:endParaRPr lang="en-US" dirty="0"/>
+          </a:p>
+        </p:txBody>
+      </p:sp>
+    </p:spTree>
+    <p:extLst>
+      <p:ext uri="{BB962C8B-B14F-4D97-AF65-F5344CB8AC3E}">
+        <p14:creationId xmlns:p14="http://schemas.microsoft.com/office/powerpoint/2010/main" val="1156835308"/>
+      </p:ext>
+    </p:extLst>
+  </p:cSld>
+  <p:clrMapOvr>
+    <a:masterClrMapping/>
+  </p:clrMapOvr>
+</p:sld>
+</file>
+
+<file path=ppt/slides/slide6.xml><?xml version="1.0" encoding="utf-8"?>
+<p:sld xmlns:a="http://schemas.openxmlformats.org/drawingml/2006/main" xmlns:r="http://schemas.openxmlformats.org/officeDocument/2006/relationships" xmlns:p="http://schemas.openxmlformats.org/presentationml/2006/main">
+  <p:cSld>
+    <p:bg>
+      <p:bgPr>
+        <a:solidFill>
+          <a:schemeClr val="bg2"/>
+        </a:solidFill>
+        <a:effectLst/>
+      </p:bgPr>
+    </p:bg>
+    <p:spTree>
+      <p:nvGrpSpPr>
+        <p:cNvPr id="1" name=""/>
+        <p:cNvGrpSpPr/>
+        <p:nvPr/>
+      </p:nvGrpSpPr>
+      <p:grpSpPr>
+        <a:xfrm>
+          <a:off x="0" y="0"/>
+          <a:ext cx="0" cy="0"/>
+          <a:chOff x="0" y="0"/>
+          <a:chExt cx="0" cy="0"/>
+        </a:xfrm>
+      </p:grpSpPr>
+      <p:sp>
+        <p:nvSpPr>
+          <p:cNvPr id="2" name="Title 1">
+            <a:extLst>
+              <a:ext uri="{FF2B5EF4-FFF2-40B4-BE49-F238E27FC236}">
+                <a16:creationId xmlns:a16="http://schemas.microsoft.com/office/drawing/2014/main" id="{242AAF47-7888-478B-96F0-BEB85F97CDA6}"/>
+              </a:ext>
+            </a:extLst>
+          </p:cNvPr>
+          <p:cNvSpPr>
+            <a:spLocks noGrp="1"/>
+          </p:cNvSpPr>
+          <p:nvPr>
+            <p:ph type="title"/>
+          </p:nvPr>
+        </p:nvSpPr>
+        <p:spPr>
+          <a:xfrm>
+            <a:off x="634277" y="284176"/>
+            <a:ext cx="3670874" cy="1508760"/>
+          </a:xfrm>
+        </p:spPr>
+        <p:txBody>
+          <a:bodyPr>
+            <a:normAutofit/>
+          </a:bodyPr>
+          <a:lstStyle/>
+          <a:p>
+            <a:r>
+              <a:rPr lang="en-US"/>
+              <a:t>SOLOMON</a:t>
+            </a:r>
+            <a:endParaRPr lang="en-GB"/>
+          </a:p>
+        </p:txBody>
+      </p:sp>
+      <p:sp>
+        <p:nvSpPr>
+          <p:cNvPr id="3" name="Content Placeholder 2">
+            <a:extLst>
+              <a:ext uri="{FF2B5EF4-FFF2-40B4-BE49-F238E27FC236}">
+                <a16:creationId xmlns:a16="http://schemas.microsoft.com/office/drawing/2014/main" id="{471CCB88-6F1D-47AA-8042-15BB4B335CD2}"/>
+              </a:ext>
+            </a:extLst>
+          </p:cNvPr>
+          <p:cNvSpPr>
+            <a:spLocks noGrp="1"/>
+          </p:cNvSpPr>
+          <p:nvPr>
+            <p:ph idx="1"/>
+          </p:nvPr>
+        </p:nvSpPr>
+        <p:spPr>
+          <a:xfrm>
+            <a:off x="634277" y="2011680"/>
+            <a:ext cx="3676678" cy="4206240"/>
+          </a:xfrm>
+        </p:spPr>
+        <p:txBody>
+          <a:bodyPr>
+            <a:normAutofit/>
+          </a:bodyPr>
+          <a:lstStyle/>
+          <a:p>
+            <a:pPr marL="0" indent="0">
+              <a:buNone/>
+            </a:pPr>
+            <a:r>
+              <a:rPr lang="en-US"/>
+              <a:t>Primary Role:</a:t>
+            </a:r>
+          </a:p>
+          <a:p>
+            <a:r>
+              <a:rPr lang="en-US"/>
+              <a:t>Technical Lead</a:t>
+            </a:r>
+          </a:p>
+          <a:p>
+            <a:endParaRPr lang="en-US"/>
+          </a:p>
+          <a:p>
+            <a:pPr marL="0" indent="0">
+              <a:buNone/>
+            </a:pPr>
+            <a:r>
+              <a:rPr lang="en-US"/>
+              <a:t>Secondary Role(s):</a:t>
+            </a:r>
+          </a:p>
+          <a:p>
+            <a:r>
+              <a:rPr lang="en-US"/>
+              <a:t>Repo Manager</a:t>
+            </a:r>
+          </a:p>
+          <a:p>
+            <a:r>
+              <a:rPr lang="en-US"/>
+              <a:t>Technical Relations Manager</a:t>
+            </a:r>
+          </a:p>
+          <a:p>
+            <a:endParaRPr lang="en-GB"/>
+          </a:p>
+        </p:txBody>
+      </p:sp>
+      <p:sp>
+        <p:nvSpPr>
+          <p:cNvPr id="55" name="Rectangle 48">
+            <a:extLst>
+              <a:ext uri="{FF2B5EF4-FFF2-40B4-BE49-F238E27FC236}">
+                <a16:creationId xmlns:a16="http://schemas.microsoft.com/office/drawing/2014/main" id="{94DBFBD2-23B9-4007-B82F-D0C394407024}"/>
+              </a:ext>
+              <a:ext uri="{C183D7F6-B498-43B3-948B-1728B52AA6E4}">
+                <adec:decorative xmlns:adec="http://schemas.microsoft.com/office/drawing/2017/decorative" val="1"/>
+              </a:ext>
+            </a:extLst>
+          </p:cNvPr>
+          <p:cNvSpPr>
+            <a:spLocks noGrp="1" noRot="1" noChangeAspect="1" noMove="1" noResize="1" noEditPoints="1" noAdjustHandles="1" noChangeArrowheads="1" noChangeShapeType="1" noTextEdit="1"/>
+          </p:cNvSpPr>
+          <p:nvPr>
+            <p:extLst>
+              <p:ext uri="{386F3935-93C4-4BCD-93E2-E3B085C9AB24}">
+                <p16:designElem xmlns:p16="http://schemas.microsoft.com/office/powerpoint/2015/main" val="1"/>
+              </p:ext>
+            </p:extLst>
+          </p:nvPr>
+        </p:nvSpPr>
+        <p:spPr>
+          <a:xfrm>
+            <a:off x="4625190" y="0"/>
+            <a:ext cx="7566810" cy="6858000"/>
+          </a:xfrm>
+          <a:prstGeom prst="rect">
+            <a:avLst/>
+          </a:prstGeom>
+          <a:solidFill>
+            <a:schemeClr val="tx1"/>
+          </a:solidFill>
+          <a:ln>
+            <a:noFill/>
+          </a:ln>
+        </p:spPr>
+        <p:style>
+          <a:lnRef idx="2">
+            <a:schemeClr val="accent1">
+              <a:shade val="50000"/>
+            </a:schemeClr>
+          </a:lnRef>
+          <a:fillRef idx="1001">
+            <a:schemeClr val="lt1"/>
+          </a:fillRef>
+          <a:effectRef idx="0">
+            <a:schemeClr val="accent1"/>
+          </a:effectRef>
+          <a:fontRef idx="minor">
+            <a:schemeClr val="lt1"/>
+          </a:fontRef>
+        </p:style>
+        <p:txBody>
+          <a:bodyPr rtlCol="0" anchor="ctr"/>
+          <a:lstStyle/>
+          <a:p>
+            <a:pPr algn="ctr"/>
+            <a:endParaRPr lang="en-US" dirty="0"/>
+          </a:p>
+        </p:txBody>
+      </p:sp>
     </p:spTree>
     <p:extLst>
       <p:ext uri="{BB962C8B-B14F-4D97-AF65-F5344CB8AC3E}">
@@ -9123,12 +9789,12 @@
     </p:extLst>
   </p:cSld>
   <p:clrMapOvr>
-    <a:overrideClrMapping bg1="lt1" tx1="dk1" bg2="lt2" tx2="dk2" accent1="accent1" accent2="accent2" accent3="accent3" accent4="accent4" accent5="accent5" accent6="accent6" hlink="hlink" folHlink="folHlink"/>
+    <a:masterClrMapping/>
   </p:clrMapOvr>
 </p:sld>
 </file>
 
-<file path=ppt/slides/slide6.xml><?xml version="1.0" encoding="utf-8"?>
+<file path=ppt/slides/slide7.xml><?xml version="1.0" encoding="utf-8"?>
 <p:sld xmlns:a="http://schemas.openxmlformats.org/drawingml/2006/main" xmlns:r="http://schemas.openxmlformats.org/officeDocument/2006/relationships" xmlns:p="http://schemas.openxmlformats.org/presentationml/2006/main">
   <p:cSld>
     <p:spTree>
@@ -9250,7 +9916,7 @@
 </p:sld>
 </file>
 
-<file path=ppt/slides/slide7.xml><?xml version="1.0" encoding="utf-8"?>
+<file path=ppt/slides/slide8.xml><?xml version="1.0" encoding="utf-8"?>
 <p:sld xmlns:a="http://schemas.openxmlformats.org/drawingml/2006/main" xmlns:r="http://schemas.openxmlformats.org/officeDocument/2006/relationships" xmlns:p="http://schemas.openxmlformats.org/presentationml/2006/main">
   <p:cSld>
     <p:spTree>
@@ -9370,7 +10036,7 @@
 </p:sld>
 </file>
 
-<file path=ppt/slides/slide8.xml><?xml version="1.0" encoding="utf-8"?>
+<file path=ppt/slides/slide9.xml><?xml version="1.0" encoding="utf-8"?>
 <p:sld xmlns:a="http://schemas.openxmlformats.org/drawingml/2006/main" xmlns:r="http://schemas.openxmlformats.org/officeDocument/2006/relationships" xmlns:p="http://schemas.openxmlformats.org/presentationml/2006/main">
   <p:cSld>
     <p:bg>
@@ -9705,126 +10371,6 @@
   </p:cSld>
   <p:clrMapOvr>
     <a:overrideClrMapping bg1="lt1" tx1="dk1" bg2="lt2" tx2="dk2" accent1="accent1" accent2="accent2" accent3="accent3" accent4="accent4" accent5="accent5" accent6="accent6" hlink="hlink" folHlink="folHlink"/>
-  </p:clrMapOvr>
-</p:sld>
-</file>
-
-<file path=ppt/slides/slide9.xml><?xml version="1.0" encoding="utf-8"?>
-<p:sld xmlns:a="http://schemas.openxmlformats.org/drawingml/2006/main" xmlns:r="http://schemas.openxmlformats.org/officeDocument/2006/relationships" xmlns:p="http://schemas.openxmlformats.org/presentationml/2006/main">
-  <p:cSld>
-    <p:spTree>
-      <p:nvGrpSpPr>
-        <p:cNvPr id="1" name=""/>
-        <p:cNvGrpSpPr/>
-        <p:nvPr/>
-      </p:nvGrpSpPr>
-      <p:grpSpPr>
-        <a:xfrm>
-          <a:off x="0" y="0"/>
-          <a:ext cx="0" cy="0"/>
-          <a:chOff x="0" y="0"/>
-          <a:chExt cx="0" cy="0"/>
-        </a:xfrm>
-      </p:grpSpPr>
-      <p:sp>
-        <p:nvSpPr>
-          <p:cNvPr id="2" name="Title 1">
-            <a:extLst>
-              <a:ext uri="{FF2B5EF4-FFF2-40B4-BE49-F238E27FC236}">
-                <a16:creationId xmlns:a16="http://schemas.microsoft.com/office/drawing/2014/main" id="{2BD3129F-8361-4AE5-B2A4-0C52571BB84E}"/>
-              </a:ext>
-            </a:extLst>
-          </p:cNvPr>
-          <p:cNvSpPr>
-            <a:spLocks noGrp="1"/>
-          </p:cNvSpPr>
-          <p:nvPr>
-            <p:ph type="title"/>
-          </p:nvPr>
-        </p:nvSpPr>
-        <p:spPr/>
-        <p:txBody>
-          <a:bodyPr/>
-          <a:lstStyle/>
-          <a:p>
-            <a:r>
-              <a:rPr lang="en-US" dirty="0"/>
-              <a:t>Processes used</a:t>
-            </a:r>
-            <a:endParaRPr lang="en-GB" dirty="0"/>
-          </a:p>
-        </p:txBody>
-      </p:sp>
-      <p:sp>
-        <p:nvSpPr>
-          <p:cNvPr id="3" name="Content Placeholder 2">
-            <a:extLst>
-              <a:ext uri="{FF2B5EF4-FFF2-40B4-BE49-F238E27FC236}">
-                <a16:creationId xmlns:a16="http://schemas.microsoft.com/office/drawing/2014/main" id="{E6490FFA-79CB-4876-8987-89C5113E0593}"/>
-              </a:ext>
-            </a:extLst>
-          </p:cNvPr>
-          <p:cNvSpPr>
-            <a:spLocks noGrp="1"/>
-          </p:cNvSpPr>
-          <p:nvPr>
-            <p:ph idx="1"/>
-          </p:nvPr>
-        </p:nvSpPr>
-        <p:spPr/>
-        <p:txBody>
-          <a:bodyPr/>
-          <a:lstStyle/>
-          <a:p>
-            <a:endParaRPr lang="en-GB" dirty="0"/>
-          </a:p>
-        </p:txBody>
-      </p:sp>
-      <p:pic>
-        <p:nvPicPr>
-          <p:cNvPr id="4" name="Picture 3" descr="A picture containing drawing&#10;&#10;Description automatically generated">
-            <a:extLst>
-              <a:ext uri="{FF2B5EF4-FFF2-40B4-BE49-F238E27FC236}">
-                <a16:creationId xmlns:a16="http://schemas.microsoft.com/office/drawing/2014/main" id="{0C72EFB7-E9E3-4B9A-B96F-4F33E41B3944}"/>
-              </a:ext>
-            </a:extLst>
-          </p:cNvPr>
-          <p:cNvPicPr>
-            <a:picLocks noChangeAspect="1"/>
-          </p:cNvPicPr>
-          <p:nvPr/>
-        </p:nvPicPr>
-        <p:blipFill>
-          <a:blip r:embed="rId2">
-            <a:extLst>
-              <a:ext uri="{28A0092B-C50C-407E-A947-70E740481C1C}">
-                <a14:useLocalDpi xmlns:a14="http://schemas.microsoft.com/office/drawing/2010/main" val="0"/>
-              </a:ext>
-            </a:extLst>
-          </a:blip>
-          <a:stretch>
-            <a:fillRect/>
-          </a:stretch>
-        </p:blipFill>
-        <p:spPr>
-          <a:xfrm>
-            <a:off x="10588487" y="284176"/>
-            <a:ext cx="1506507" cy="1506507"/>
-          </a:xfrm>
-          <a:prstGeom prst="rect">
-            <a:avLst/>
-          </a:prstGeom>
-        </p:spPr>
-      </p:pic>
-    </p:spTree>
-    <p:extLst>
-      <p:ext uri="{BB962C8B-B14F-4D97-AF65-F5344CB8AC3E}">
-        <p14:creationId xmlns:p14="http://schemas.microsoft.com/office/powerpoint/2010/main" val="1207510954"/>
-      </p:ext>
-    </p:extLst>
-  </p:cSld>
-  <p:clrMapOvr>
-    <a:masterClrMapping/>
   </p:clrMapOvr>
 </p:sld>
 </file>

</xml_diff>

<commit_message>
Added jokey mug shot of solomon
</commit_message>
<xml_diff>
--- a/Documentation/Team Presentation.pptx
+++ b/Documentation/Team Presentation.pptx
@@ -8938,247 +8938,7 @@
       </p:grpSpPr>
       <p:sp>
         <p:nvSpPr>
-          <p:cNvPr id="2" name="Title 1">
-            <a:extLst>
-              <a:ext uri="{FF2B5EF4-FFF2-40B4-BE49-F238E27FC236}">
-                <a16:creationId xmlns:a16="http://schemas.microsoft.com/office/drawing/2014/main" id="{242AAF47-7888-478B-96F0-BEB85F97CDA6}"/>
-              </a:ext>
-            </a:extLst>
-          </p:cNvPr>
-          <p:cNvSpPr>
-            <a:spLocks noGrp="1"/>
-          </p:cNvSpPr>
-          <p:nvPr>
-            <p:ph type="title"/>
-          </p:nvPr>
-        </p:nvSpPr>
-        <p:spPr>
-          <a:xfrm>
-            <a:off x="634277" y="284176"/>
-            <a:ext cx="3670874" cy="1508760"/>
-          </a:xfrm>
-        </p:spPr>
-        <p:txBody>
-          <a:bodyPr>
-            <a:normAutofit/>
-          </a:bodyPr>
-          <a:lstStyle/>
-          <a:p>
-            <a:r>
-              <a:rPr lang="en-US"/>
-              <a:t>Josie</a:t>
-            </a:r>
-            <a:endParaRPr lang="en-GB"/>
-          </a:p>
-        </p:txBody>
-      </p:sp>
-      <p:sp>
-        <p:nvSpPr>
-          <p:cNvPr id="3" name="Content Placeholder 2">
-            <a:extLst>
-              <a:ext uri="{FF2B5EF4-FFF2-40B4-BE49-F238E27FC236}">
-                <a16:creationId xmlns:a16="http://schemas.microsoft.com/office/drawing/2014/main" id="{471CCB88-6F1D-47AA-8042-15BB4B335CD2}"/>
-              </a:ext>
-            </a:extLst>
-          </p:cNvPr>
-          <p:cNvSpPr>
-            <a:spLocks noGrp="1"/>
-          </p:cNvSpPr>
-          <p:nvPr>
-            <p:ph idx="1"/>
-          </p:nvPr>
-        </p:nvSpPr>
-        <p:spPr>
-          <a:xfrm>
-            <a:off x="634277" y="2011680"/>
-            <a:ext cx="3676678" cy="4206240"/>
-          </a:xfrm>
-        </p:spPr>
-        <p:txBody>
-          <a:bodyPr>
-            <a:normAutofit/>
-          </a:bodyPr>
-          <a:lstStyle/>
-          <a:p>
-            <a:pPr marL="0" indent="0">
-              <a:buNone/>
-            </a:pPr>
-            <a:r>
-              <a:rPr lang="en-US"/>
-              <a:t>Primary Role:</a:t>
-            </a:r>
-          </a:p>
-          <a:p>
-            <a:r>
-              <a:rPr lang="en-US"/>
-              <a:t>Scrum Master</a:t>
-            </a:r>
-          </a:p>
-          <a:p>
-            <a:endParaRPr lang="en-US"/>
-          </a:p>
-          <a:p>
-            <a:pPr marL="0" indent="0">
-              <a:buNone/>
-            </a:pPr>
-            <a:r>
-              <a:rPr lang="en-US"/>
-              <a:t>Secondary Role(s):</a:t>
-            </a:r>
-          </a:p>
-          <a:p>
-            <a:r>
-              <a:rPr lang="en-US"/>
-              <a:t>Lead Designer</a:t>
-            </a:r>
-          </a:p>
-          <a:p>
-            <a:r>
-              <a:rPr lang="en-US"/>
-              <a:t>QA Tester</a:t>
-            </a:r>
-          </a:p>
-          <a:p>
-            <a:endParaRPr lang="en-GB"/>
-          </a:p>
-        </p:txBody>
-      </p:sp>
-      <p:sp>
-        <p:nvSpPr>
-          <p:cNvPr id="67" name="Rectangle 62">
-            <a:extLst>
-              <a:ext uri="{FF2B5EF4-FFF2-40B4-BE49-F238E27FC236}">
-                <a16:creationId xmlns:a16="http://schemas.microsoft.com/office/drawing/2014/main" id="{94DBFBD2-23B9-4007-B82F-D0C394407024}"/>
-              </a:ext>
-              <a:ext uri="{C183D7F6-B498-43B3-948B-1728B52AA6E4}">
-                <adec:decorative xmlns:adec="http://schemas.microsoft.com/office/drawing/2017/decorative" val="1"/>
-              </a:ext>
-            </a:extLst>
-          </p:cNvPr>
-          <p:cNvSpPr>
-            <a:spLocks noGrp="1" noRot="1" noChangeAspect="1" noMove="1" noResize="1" noEditPoints="1" noAdjustHandles="1" noChangeArrowheads="1" noChangeShapeType="1" noTextEdit="1"/>
-          </p:cNvSpPr>
-          <p:nvPr>
-            <p:extLst>
-              <p:ext uri="{386F3935-93C4-4BCD-93E2-E3B085C9AB24}">
-                <p16:designElem xmlns:p16="http://schemas.microsoft.com/office/powerpoint/2015/main" val="1"/>
-              </p:ext>
-            </p:extLst>
-          </p:nvPr>
-        </p:nvSpPr>
-        <p:spPr>
-          <a:xfrm>
-            <a:off x="4625190" y="0"/>
-            <a:ext cx="7566810" cy="6858000"/>
-          </a:xfrm>
-          <a:prstGeom prst="rect">
-            <a:avLst/>
-          </a:prstGeom>
-          <a:solidFill>
-            <a:schemeClr val="tx1"/>
-          </a:solidFill>
-          <a:ln>
-            <a:noFill/>
-          </a:ln>
-        </p:spPr>
-        <p:style>
-          <a:lnRef idx="2">
-            <a:schemeClr val="accent1">
-              <a:shade val="50000"/>
-            </a:schemeClr>
-          </a:lnRef>
-          <a:fillRef idx="1001">
-            <a:schemeClr val="lt1"/>
-          </a:fillRef>
-          <a:effectRef idx="0">
-            <a:schemeClr val="accent1"/>
-          </a:effectRef>
-          <a:fontRef idx="minor">
-            <a:schemeClr val="lt1"/>
-          </a:fontRef>
-        </p:style>
-        <p:txBody>
-          <a:bodyPr rtlCol="0" anchor="ctr"/>
-          <a:lstStyle/>
-          <a:p>
-            <a:pPr algn="ctr"/>
-            <a:endParaRPr lang="en-US" dirty="0"/>
-          </a:p>
-        </p:txBody>
-      </p:sp>
-      <p:sp>
-        <p:nvSpPr>
-          <p:cNvPr id="7" name="TextBox 6">
-            <a:extLst>
-              <a:ext uri="{FF2B5EF4-FFF2-40B4-BE49-F238E27FC236}">
-                <a16:creationId xmlns:a16="http://schemas.microsoft.com/office/drawing/2014/main" id="{C06EABB7-F1A6-9A48-9ABF-EA1D3903213B}"/>
-              </a:ext>
-            </a:extLst>
-          </p:cNvPr>
-          <p:cNvSpPr txBox="1"/>
-          <p:nvPr/>
-        </p:nvSpPr>
-        <p:spPr>
-          <a:xfrm>
-            <a:off x="9879724" y="1902372"/>
-            <a:ext cx="184731" cy="369332"/>
-          </a:xfrm>
-          <a:prstGeom prst="rect">
-            <a:avLst/>
-          </a:prstGeom>
-          <a:noFill/>
-        </p:spPr>
-        <p:txBody>
-          <a:bodyPr wrap="none" rtlCol="0">
-            <a:spAutoFit/>
-          </a:bodyPr>
-          <a:lstStyle/>
-          <a:p>
-            <a:endParaRPr lang="en-US" dirty="0"/>
-          </a:p>
-        </p:txBody>
-      </p:sp>
-    </p:spTree>
-    <p:extLst>
-      <p:ext uri="{BB962C8B-B14F-4D97-AF65-F5344CB8AC3E}">
-        <p14:creationId xmlns:p14="http://schemas.microsoft.com/office/powerpoint/2010/main" val="3552337688"/>
-      </p:ext>
-    </p:extLst>
-  </p:cSld>
-  <p:clrMapOvr>
-    <a:masterClrMapping/>
-  </p:clrMapOvr>
-</p:sld>
-</file>
-
-<file path=ppt/slides/slide5.xml><?xml version="1.0" encoding="utf-8"?>
-<p:sld xmlns:a="http://schemas.openxmlformats.org/drawingml/2006/main" xmlns:r="http://schemas.openxmlformats.org/officeDocument/2006/relationships" xmlns:p="http://schemas.openxmlformats.org/presentationml/2006/main">
-  <p:cSld>
-    <p:bg>
-      <p:bgPr>
-        <a:solidFill>
-          <a:schemeClr val="bg2"/>
-        </a:solidFill>
-        <a:effectLst/>
-      </p:bgPr>
-    </p:bg>
-    <p:spTree>
-      <p:nvGrpSpPr>
-        <p:cNvPr id="1" name=""/>
-        <p:cNvGrpSpPr/>
-        <p:nvPr/>
-      </p:nvGrpSpPr>
-      <p:grpSpPr>
-        <a:xfrm>
-          <a:off x="0" y="0"/>
-          <a:ext cx="0" cy="0"/>
-          <a:chOff x="0" y="0"/>
-          <a:chExt cx="0" cy="0"/>
-        </a:xfrm>
-      </p:grpSpPr>
-      <p:sp>
-        <p:nvSpPr>
-          <p:cNvPr id="54" name="Rectangle 53">
+          <p:cNvPr id="72" name="Rectangle 71">
             <a:extLst>
               <a:ext uri="{FF2B5EF4-FFF2-40B4-BE49-F238E27FC236}">
                 <a16:creationId xmlns:a16="http://schemas.microsoft.com/office/drawing/2014/main" id="{53FD8994-38E8-4E51-9444-3447A171944C}"/>
@@ -9238,7 +8998,7 @@
       </p:sp>
       <p:sp>
         <p:nvSpPr>
-          <p:cNvPr id="56" name="Rectangle 55">
+          <p:cNvPr id="74" name="Rectangle 73">
             <a:extLst>
               <a:ext uri="{FF2B5EF4-FFF2-40B4-BE49-F238E27FC236}">
                 <a16:creationId xmlns:a16="http://schemas.microsoft.com/office/drawing/2014/main" id="{F71673FE-0587-4591-8D3B-D7F7345E8ACC}"/>
@@ -9429,6 +9189,406 @@
           <a:p>
             <a:r>
               <a:rPr lang="en-US"/>
+              <a:t>Josie</a:t>
+            </a:r>
+            <a:endParaRPr lang="en-GB"/>
+          </a:p>
+        </p:txBody>
+      </p:sp>
+      <p:sp>
+        <p:nvSpPr>
+          <p:cNvPr id="3" name="Content Placeholder 2">
+            <a:extLst>
+              <a:ext uri="{FF2B5EF4-FFF2-40B4-BE49-F238E27FC236}">
+                <a16:creationId xmlns:a16="http://schemas.microsoft.com/office/drawing/2014/main" id="{471CCB88-6F1D-47AA-8042-15BB4B335CD2}"/>
+              </a:ext>
+            </a:extLst>
+          </p:cNvPr>
+          <p:cNvSpPr>
+            <a:spLocks noGrp="1"/>
+          </p:cNvSpPr>
+          <p:nvPr>
+            <p:ph idx="1"/>
+          </p:nvPr>
+        </p:nvSpPr>
+        <p:spPr>
+          <a:xfrm>
+            <a:off x="6454363" y="2011680"/>
+            <a:ext cx="5090578" cy="4206240"/>
+          </a:xfrm>
+        </p:spPr>
+        <p:txBody>
+          <a:bodyPr>
+            <a:normAutofit/>
+          </a:bodyPr>
+          <a:lstStyle/>
+          <a:p>
+            <a:pPr marL="0" indent="0">
+              <a:buNone/>
+            </a:pPr>
+            <a:r>
+              <a:rPr lang="en-US"/>
+              <a:t>Primary Role:</a:t>
+            </a:r>
+          </a:p>
+          <a:p>
+            <a:r>
+              <a:rPr lang="en-US"/>
+              <a:t>Scrum Master</a:t>
+            </a:r>
+          </a:p>
+          <a:p>
+            <a:endParaRPr lang="en-US"/>
+          </a:p>
+          <a:p>
+            <a:pPr marL="0" indent="0">
+              <a:buNone/>
+            </a:pPr>
+            <a:r>
+              <a:rPr lang="en-US"/>
+              <a:t>Secondary Role(s):</a:t>
+            </a:r>
+          </a:p>
+          <a:p>
+            <a:r>
+              <a:rPr lang="en-US"/>
+              <a:t>Lead Designer</a:t>
+            </a:r>
+          </a:p>
+          <a:p>
+            <a:r>
+              <a:rPr lang="en-US"/>
+              <a:t>QA Tester</a:t>
+            </a:r>
+          </a:p>
+          <a:p>
+            <a:endParaRPr lang="en-GB"/>
+          </a:p>
+        </p:txBody>
+      </p:sp>
+      <p:sp>
+        <p:nvSpPr>
+          <p:cNvPr id="7" name="TextBox 6">
+            <a:extLst>
+              <a:ext uri="{FF2B5EF4-FFF2-40B4-BE49-F238E27FC236}">
+                <a16:creationId xmlns:a16="http://schemas.microsoft.com/office/drawing/2014/main" id="{C06EABB7-F1A6-9A48-9ABF-EA1D3903213B}"/>
+              </a:ext>
+            </a:extLst>
+          </p:cNvPr>
+          <p:cNvSpPr txBox="1"/>
+          <p:nvPr/>
+        </p:nvSpPr>
+        <p:spPr>
+          <a:xfrm>
+            <a:off x="9879724" y="1902372"/>
+            <a:ext cx="184731" cy="369332"/>
+          </a:xfrm>
+          <a:prstGeom prst="rect">
+            <a:avLst/>
+          </a:prstGeom>
+          <a:noFill/>
+        </p:spPr>
+        <p:txBody>
+          <a:bodyPr wrap="none" rtlCol="0">
+            <a:spAutoFit/>
+          </a:bodyPr>
+          <a:lstStyle/>
+          <a:p>
+            <a:endParaRPr lang="en-US" dirty="0"/>
+          </a:p>
+        </p:txBody>
+      </p:sp>
+    </p:spTree>
+    <p:extLst>
+      <p:ext uri="{BB962C8B-B14F-4D97-AF65-F5344CB8AC3E}">
+        <p14:creationId xmlns:p14="http://schemas.microsoft.com/office/powerpoint/2010/main" val="3552337688"/>
+      </p:ext>
+    </p:extLst>
+  </p:cSld>
+  <p:clrMapOvr>
+    <a:masterClrMapping/>
+  </p:clrMapOvr>
+</p:sld>
+</file>
+
+<file path=ppt/slides/slide5.xml><?xml version="1.0" encoding="utf-8"?>
+<p:sld xmlns:a="http://schemas.openxmlformats.org/drawingml/2006/main" xmlns:r="http://schemas.openxmlformats.org/officeDocument/2006/relationships" xmlns:p="http://schemas.openxmlformats.org/presentationml/2006/main">
+  <p:cSld>
+    <p:bg>
+      <p:bgPr>
+        <a:solidFill>
+          <a:schemeClr val="bg2"/>
+        </a:solidFill>
+        <a:effectLst/>
+      </p:bgPr>
+    </p:bg>
+    <p:spTree>
+      <p:nvGrpSpPr>
+        <p:cNvPr id="1" name=""/>
+        <p:cNvGrpSpPr/>
+        <p:nvPr/>
+      </p:nvGrpSpPr>
+      <p:grpSpPr>
+        <a:xfrm>
+          <a:off x="0" y="0"/>
+          <a:ext cx="0" cy="0"/>
+          <a:chOff x="0" y="0"/>
+          <a:chExt cx="0" cy="0"/>
+        </a:xfrm>
+      </p:grpSpPr>
+      <p:sp>
+        <p:nvSpPr>
+          <p:cNvPr id="54" name="Rectangle 53">
+            <a:extLst>
+              <a:ext uri="{FF2B5EF4-FFF2-40B4-BE49-F238E27FC236}">
+                <a16:creationId xmlns:a16="http://schemas.microsoft.com/office/drawing/2014/main" id="{53FD8994-38E8-4E51-9444-3447A171944C}"/>
+              </a:ext>
+              <a:ext uri="{C183D7F6-B498-43B3-948B-1728B52AA6E4}">
+                <adec:decorative xmlns:adec="http://schemas.microsoft.com/office/drawing/2017/decorative" val="1"/>
+              </a:ext>
+            </a:extLst>
+          </p:cNvPr>
+          <p:cNvSpPr>
+            <a:spLocks noGrp="1" noRot="1" noChangeAspect="1" noMove="1" noResize="1" noEditPoints="1" noAdjustHandles="1" noChangeArrowheads="1" noChangeShapeType="1" noTextEdit="1"/>
+          </p:cNvSpPr>
+          <p:nvPr>
+            <p:extLst>
+              <p:ext uri="{386F3935-93C4-4BCD-93E2-E3B085C9AB24}">
+                <p16:designElem xmlns:p16="http://schemas.microsoft.com/office/powerpoint/2015/main" val="1"/>
+              </p:ext>
+            </p:extLst>
+          </p:nvPr>
+        </p:nvSpPr>
+        <p:spPr>
+          <a:xfrm>
+            <a:off x="0" y="0"/>
+            <a:ext cx="6125497" cy="6858000"/>
+          </a:xfrm>
+          <a:prstGeom prst="rect">
+            <a:avLst/>
+          </a:prstGeom>
+          <a:ln>
+            <a:noFill/>
+          </a:ln>
+        </p:spPr>
+        <p:style>
+          <a:lnRef idx="2">
+            <a:schemeClr val="accent1">
+              <a:shade val="50000"/>
+            </a:schemeClr>
+          </a:lnRef>
+          <a:fillRef idx="1001">
+            <a:schemeClr val="lt1"/>
+          </a:fillRef>
+          <a:effectRef idx="0">
+            <a:schemeClr val="accent1"/>
+          </a:effectRef>
+          <a:fontRef idx="minor">
+            <a:schemeClr val="lt1"/>
+          </a:fontRef>
+        </p:style>
+        <p:txBody>
+          <a:bodyPr rtlCol="0" anchor="ctr"/>
+          <a:lstStyle/>
+          <a:p>
+            <a:pPr algn="ctr"/>
+            <a:endParaRPr lang="en-US" dirty="0"/>
+          </a:p>
+        </p:txBody>
+      </p:sp>
+      <p:sp>
+        <p:nvSpPr>
+          <p:cNvPr id="56" name="Rectangle 55">
+            <a:extLst>
+              <a:ext uri="{FF2B5EF4-FFF2-40B4-BE49-F238E27FC236}">
+                <a16:creationId xmlns:a16="http://schemas.microsoft.com/office/drawing/2014/main" id="{F71673FE-0587-4591-8D3B-D7F7345E8ACC}"/>
+              </a:ext>
+              <a:ext uri="{C183D7F6-B498-43B3-948B-1728B52AA6E4}">
+                <adec:decorative xmlns:adec="http://schemas.microsoft.com/office/drawing/2017/decorative" val="1"/>
+              </a:ext>
+            </a:extLst>
+          </p:cNvPr>
+          <p:cNvSpPr>
+            <a:spLocks noGrp="1" noRot="1" noChangeAspect="1" noMove="1" noResize="1" noEditPoints="1" noAdjustHandles="1" noChangeArrowheads="1" noChangeShapeType="1" noTextEdit="1"/>
+          </p:cNvSpPr>
+          <p:nvPr>
+            <p:extLst>
+              <p:ext uri="{386F3935-93C4-4BCD-93E2-E3B085C9AB24}">
+                <p16:designElem xmlns:p16="http://schemas.microsoft.com/office/powerpoint/2015/main" val="1"/>
+              </p:ext>
+            </p:extLst>
+          </p:nvPr>
+        </p:nvSpPr>
+        <p:spPr>
+          <a:xfrm>
+            <a:off x="6129910" y="176109"/>
+            <a:ext cx="6059524" cy="1645919"/>
+          </a:xfrm>
+          <a:prstGeom prst="rect">
+            <a:avLst/>
+          </a:prstGeom>
+          <a:solidFill>
+            <a:schemeClr val="tx1">
+              <a:alpha val="95000"/>
+            </a:schemeClr>
+          </a:solidFill>
+          <a:ln>
+            <a:noFill/>
+          </a:ln>
+        </p:spPr>
+        <p:style>
+          <a:lnRef idx="2">
+            <a:schemeClr val="accent1">
+              <a:shade val="50000"/>
+            </a:schemeClr>
+          </a:lnRef>
+          <a:fillRef idx="1">
+            <a:schemeClr val="accent1"/>
+          </a:fillRef>
+          <a:effectRef idx="0">
+            <a:schemeClr val="accent1"/>
+          </a:effectRef>
+          <a:fontRef idx="minor">
+            <a:schemeClr val="lt1"/>
+          </a:fontRef>
+        </p:style>
+        <p:txBody>
+          <a:bodyPr rtlCol="0" anchor="ctr"/>
+          <a:lstStyle>
+            <a:defPPr>
+              <a:defRPr lang="en-US"/>
+            </a:defPPr>
+            <a:lvl1pPr marL="0" algn="l" defTabSz="914400" rtl="0" eaLnBrk="1" latinLnBrk="0" hangingPunct="1">
+              <a:defRPr sz="1800" kern="1200">
+                <a:solidFill>
+                  <a:schemeClr val="lt1"/>
+                </a:solidFill>
+                <a:latin typeface="+mn-lt"/>
+                <a:ea typeface="+mn-ea"/>
+                <a:cs typeface="+mn-cs"/>
+              </a:defRPr>
+            </a:lvl1pPr>
+            <a:lvl2pPr marL="457200" algn="l" defTabSz="914400" rtl="0" eaLnBrk="1" latinLnBrk="0" hangingPunct="1">
+              <a:defRPr sz="1800" kern="1200">
+                <a:solidFill>
+                  <a:schemeClr val="lt1"/>
+                </a:solidFill>
+                <a:latin typeface="+mn-lt"/>
+                <a:ea typeface="+mn-ea"/>
+                <a:cs typeface="+mn-cs"/>
+              </a:defRPr>
+            </a:lvl2pPr>
+            <a:lvl3pPr marL="914400" algn="l" defTabSz="914400" rtl="0" eaLnBrk="1" latinLnBrk="0" hangingPunct="1">
+              <a:defRPr sz="1800" kern="1200">
+                <a:solidFill>
+                  <a:schemeClr val="lt1"/>
+                </a:solidFill>
+                <a:latin typeface="+mn-lt"/>
+                <a:ea typeface="+mn-ea"/>
+                <a:cs typeface="+mn-cs"/>
+              </a:defRPr>
+            </a:lvl3pPr>
+            <a:lvl4pPr marL="1371600" algn="l" defTabSz="914400" rtl="0" eaLnBrk="1" latinLnBrk="0" hangingPunct="1">
+              <a:defRPr sz="1800" kern="1200">
+                <a:solidFill>
+                  <a:schemeClr val="lt1"/>
+                </a:solidFill>
+                <a:latin typeface="+mn-lt"/>
+                <a:ea typeface="+mn-ea"/>
+                <a:cs typeface="+mn-cs"/>
+              </a:defRPr>
+            </a:lvl4pPr>
+            <a:lvl5pPr marL="1828800" algn="l" defTabSz="914400" rtl="0" eaLnBrk="1" latinLnBrk="0" hangingPunct="1">
+              <a:defRPr sz="1800" kern="1200">
+                <a:solidFill>
+                  <a:schemeClr val="lt1"/>
+                </a:solidFill>
+                <a:latin typeface="+mn-lt"/>
+                <a:ea typeface="+mn-ea"/>
+                <a:cs typeface="+mn-cs"/>
+              </a:defRPr>
+            </a:lvl5pPr>
+            <a:lvl6pPr marL="2286000" algn="l" defTabSz="914400" rtl="0" eaLnBrk="1" latinLnBrk="0" hangingPunct="1">
+              <a:defRPr sz="1800" kern="1200">
+                <a:solidFill>
+                  <a:schemeClr val="lt1"/>
+                </a:solidFill>
+                <a:latin typeface="+mn-lt"/>
+                <a:ea typeface="+mn-ea"/>
+                <a:cs typeface="+mn-cs"/>
+              </a:defRPr>
+            </a:lvl6pPr>
+            <a:lvl7pPr marL="2743200" algn="l" defTabSz="914400" rtl="0" eaLnBrk="1" latinLnBrk="0" hangingPunct="1">
+              <a:defRPr sz="1800" kern="1200">
+                <a:solidFill>
+                  <a:schemeClr val="lt1"/>
+                </a:solidFill>
+                <a:latin typeface="+mn-lt"/>
+                <a:ea typeface="+mn-ea"/>
+                <a:cs typeface="+mn-cs"/>
+              </a:defRPr>
+            </a:lvl7pPr>
+            <a:lvl8pPr marL="3200400" algn="l" defTabSz="914400" rtl="0" eaLnBrk="1" latinLnBrk="0" hangingPunct="1">
+              <a:defRPr sz="1800" kern="1200">
+                <a:solidFill>
+                  <a:schemeClr val="lt1"/>
+                </a:solidFill>
+                <a:latin typeface="+mn-lt"/>
+                <a:ea typeface="+mn-ea"/>
+                <a:cs typeface="+mn-cs"/>
+              </a:defRPr>
+            </a:lvl8pPr>
+            <a:lvl9pPr marL="3657600" algn="l" defTabSz="914400" rtl="0" eaLnBrk="1" latinLnBrk="0" hangingPunct="1">
+              <a:defRPr sz="1800" kern="1200">
+                <a:solidFill>
+                  <a:schemeClr val="lt1"/>
+                </a:solidFill>
+                <a:latin typeface="+mn-lt"/>
+                <a:ea typeface="+mn-ea"/>
+                <a:cs typeface="+mn-cs"/>
+              </a:defRPr>
+            </a:lvl9pPr>
+          </a:lstStyle>
+          <a:p>
+            <a:pPr algn="ctr"/>
+            <a:endParaRPr lang="en-US" dirty="0">
+              <a:solidFill>
+                <a:srgbClr val="FFFFFF"/>
+              </a:solidFill>
+            </a:endParaRPr>
+          </a:p>
+        </p:txBody>
+      </p:sp>
+      <p:sp>
+        <p:nvSpPr>
+          <p:cNvPr id="2" name="Title 1">
+            <a:extLst>
+              <a:ext uri="{FF2B5EF4-FFF2-40B4-BE49-F238E27FC236}">
+                <a16:creationId xmlns:a16="http://schemas.microsoft.com/office/drawing/2014/main" id="{242AAF47-7888-478B-96F0-BEB85F97CDA6}"/>
+              </a:ext>
+            </a:extLst>
+          </p:cNvPr>
+          <p:cNvSpPr>
+            <a:spLocks noGrp="1"/>
+          </p:cNvSpPr>
+          <p:nvPr>
+            <p:ph type="title"/>
+          </p:nvPr>
+        </p:nvSpPr>
+        <p:spPr>
+          <a:xfrm>
+            <a:off x="6449961" y="284176"/>
+            <a:ext cx="5094980" cy="1508760"/>
+          </a:xfrm>
+        </p:spPr>
+        <p:txBody>
+          <a:bodyPr>
+            <a:normAutofit/>
+          </a:bodyPr>
+          <a:lstStyle/>
+          <a:p>
+            <a:r>
+              <a:rPr lang="en-US"/>
               <a:t>ALEX</a:t>
             </a:r>
             <a:endParaRPr lang="en-GB"/>
@@ -9613,117 +9773,10 @@
       </p:grpSpPr>
       <p:sp>
         <p:nvSpPr>
-          <p:cNvPr id="2" name="Title 1">
+          <p:cNvPr id="67" name="Rectangle 66">
             <a:extLst>
               <a:ext uri="{FF2B5EF4-FFF2-40B4-BE49-F238E27FC236}">
-                <a16:creationId xmlns:a16="http://schemas.microsoft.com/office/drawing/2014/main" id="{242AAF47-7888-478B-96F0-BEB85F97CDA6}"/>
-              </a:ext>
-            </a:extLst>
-          </p:cNvPr>
-          <p:cNvSpPr>
-            <a:spLocks noGrp="1"/>
-          </p:cNvSpPr>
-          <p:nvPr>
-            <p:ph type="title"/>
-          </p:nvPr>
-        </p:nvSpPr>
-        <p:spPr>
-          <a:xfrm>
-            <a:off x="634277" y="284176"/>
-            <a:ext cx="3670874" cy="1508760"/>
-          </a:xfrm>
-        </p:spPr>
-        <p:txBody>
-          <a:bodyPr>
-            <a:normAutofit/>
-          </a:bodyPr>
-          <a:lstStyle/>
-          <a:p>
-            <a:r>
-              <a:rPr lang="en-US"/>
-              <a:t>SOLOMON</a:t>
-            </a:r>
-            <a:endParaRPr lang="en-GB"/>
-          </a:p>
-        </p:txBody>
-      </p:sp>
-      <p:sp>
-        <p:nvSpPr>
-          <p:cNvPr id="3" name="Content Placeholder 2">
-            <a:extLst>
-              <a:ext uri="{FF2B5EF4-FFF2-40B4-BE49-F238E27FC236}">
-                <a16:creationId xmlns:a16="http://schemas.microsoft.com/office/drawing/2014/main" id="{471CCB88-6F1D-47AA-8042-15BB4B335CD2}"/>
-              </a:ext>
-            </a:extLst>
-          </p:cNvPr>
-          <p:cNvSpPr>
-            <a:spLocks noGrp="1"/>
-          </p:cNvSpPr>
-          <p:nvPr>
-            <p:ph idx="1"/>
-          </p:nvPr>
-        </p:nvSpPr>
-        <p:spPr>
-          <a:xfrm>
-            <a:off x="634277" y="2011680"/>
-            <a:ext cx="3676678" cy="4206240"/>
-          </a:xfrm>
-        </p:spPr>
-        <p:txBody>
-          <a:bodyPr>
-            <a:normAutofit/>
-          </a:bodyPr>
-          <a:lstStyle/>
-          <a:p>
-            <a:pPr marL="0" indent="0">
-              <a:buNone/>
-            </a:pPr>
-            <a:r>
-              <a:rPr lang="en-US"/>
-              <a:t>Primary Role:</a:t>
-            </a:r>
-          </a:p>
-          <a:p>
-            <a:r>
-              <a:rPr lang="en-US"/>
-              <a:t>Technical Lead</a:t>
-            </a:r>
-          </a:p>
-          <a:p>
-            <a:endParaRPr lang="en-US"/>
-          </a:p>
-          <a:p>
-            <a:pPr marL="0" indent="0">
-              <a:buNone/>
-            </a:pPr>
-            <a:r>
-              <a:rPr lang="en-US"/>
-              <a:t>Secondary Role(s):</a:t>
-            </a:r>
-          </a:p>
-          <a:p>
-            <a:r>
-              <a:rPr lang="en-US"/>
-              <a:t>Repo Manager</a:t>
-            </a:r>
-          </a:p>
-          <a:p>
-            <a:r>
-              <a:rPr lang="en-US"/>
-              <a:t>Technical Relations Manager</a:t>
-            </a:r>
-          </a:p>
-          <a:p>
-            <a:endParaRPr lang="en-GB"/>
-          </a:p>
-        </p:txBody>
-      </p:sp>
-      <p:sp>
-        <p:nvSpPr>
-          <p:cNvPr id="55" name="Rectangle 48">
-            <a:extLst>
-              <a:ext uri="{FF2B5EF4-FFF2-40B4-BE49-F238E27FC236}">
-                <a16:creationId xmlns:a16="http://schemas.microsoft.com/office/drawing/2014/main" id="{94DBFBD2-23B9-4007-B82F-D0C394407024}"/>
+                <a16:creationId xmlns:a16="http://schemas.microsoft.com/office/drawing/2014/main" id="{53FD8994-38E8-4E51-9444-3447A171944C}"/>
               </a:ext>
               <a:ext uri="{C183D7F6-B498-43B3-948B-1728B52AA6E4}">
                 <adec:decorative xmlns:adec="http://schemas.microsoft.com/office/drawing/2017/decorative" val="1"/>
@@ -9743,15 +9796,12 @@
         </p:nvSpPr>
         <p:spPr>
           <a:xfrm>
-            <a:off x="4625190" y="0"/>
-            <a:ext cx="7566810" cy="6858000"/>
+            <a:off x="0" y="0"/>
+            <a:ext cx="6125497" cy="6858000"/>
           </a:xfrm>
           <a:prstGeom prst="rect">
             <a:avLst/>
           </a:prstGeom>
-          <a:solidFill>
-            <a:schemeClr val="tx1"/>
-          </a:solidFill>
           <a:ln>
             <a:noFill/>
           </a:ln>
@@ -9778,6 +9828,311 @@
           <a:p>
             <a:pPr algn="ctr"/>
             <a:endParaRPr lang="en-US" dirty="0"/>
+          </a:p>
+        </p:txBody>
+      </p:sp>
+      <p:sp>
+        <p:nvSpPr>
+          <p:cNvPr id="69" name="Rectangle 68">
+            <a:extLst>
+              <a:ext uri="{FF2B5EF4-FFF2-40B4-BE49-F238E27FC236}">
+                <a16:creationId xmlns:a16="http://schemas.microsoft.com/office/drawing/2014/main" id="{F71673FE-0587-4591-8D3B-D7F7345E8ACC}"/>
+              </a:ext>
+              <a:ext uri="{C183D7F6-B498-43B3-948B-1728B52AA6E4}">
+                <adec:decorative xmlns:adec="http://schemas.microsoft.com/office/drawing/2017/decorative" val="1"/>
+              </a:ext>
+            </a:extLst>
+          </p:cNvPr>
+          <p:cNvSpPr>
+            <a:spLocks noGrp="1" noRot="1" noChangeAspect="1" noMove="1" noResize="1" noEditPoints="1" noAdjustHandles="1" noChangeArrowheads="1" noChangeShapeType="1" noTextEdit="1"/>
+          </p:cNvSpPr>
+          <p:nvPr>
+            <p:extLst>
+              <p:ext uri="{386F3935-93C4-4BCD-93E2-E3B085C9AB24}">
+                <p16:designElem xmlns:p16="http://schemas.microsoft.com/office/powerpoint/2015/main" val="1"/>
+              </p:ext>
+            </p:extLst>
+          </p:nvPr>
+        </p:nvSpPr>
+        <p:spPr>
+          <a:xfrm>
+            <a:off x="6129910" y="176109"/>
+            <a:ext cx="6059524" cy="1645919"/>
+          </a:xfrm>
+          <a:prstGeom prst="rect">
+            <a:avLst/>
+          </a:prstGeom>
+          <a:solidFill>
+            <a:schemeClr val="tx1">
+              <a:alpha val="95000"/>
+            </a:schemeClr>
+          </a:solidFill>
+          <a:ln>
+            <a:noFill/>
+          </a:ln>
+        </p:spPr>
+        <p:style>
+          <a:lnRef idx="2">
+            <a:schemeClr val="accent1">
+              <a:shade val="50000"/>
+            </a:schemeClr>
+          </a:lnRef>
+          <a:fillRef idx="1">
+            <a:schemeClr val="accent1"/>
+          </a:fillRef>
+          <a:effectRef idx="0">
+            <a:schemeClr val="accent1"/>
+          </a:effectRef>
+          <a:fontRef idx="minor">
+            <a:schemeClr val="lt1"/>
+          </a:fontRef>
+        </p:style>
+        <p:txBody>
+          <a:bodyPr rtlCol="0" anchor="ctr"/>
+          <a:lstStyle>
+            <a:defPPr>
+              <a:defRPr lang="en-US"/>
+            </a:defPPr>
+            <a:lvl1pPr marL="0" algn="l" defTabSz="914400" rtl="0" eaLnBrk="1" latinLnBrk="0" hangingPunct="1">
+              <a:defRPr sz="1800" kern="1200">
+                <a:solidFill>
+                  <a:schemeClr val="lt1"/>
+                </a:solidFill>
+                <a:latin typeface="+mn-lt"/>
+                <a:ea typeface="+mn-ea"/>
+                <a:cs typeface="+mn-cs"/>
+              </a:defRPr>
+            </a:lvl1pPr>
+            <a:lvl2pPr marL="457200" algn="l" defTabSz="914400" rtl="0" eaLnBrk="1" latinLnBrk="0" hangingPunct="1">
+              <a:defRPr sz="1800" kern="1200">
+                <a:solidFill>
+                  <a:schemeClr val="lt1"/>
+                </a:solidFill>
+                <a:latin typeface="+mn-lt"/>
+                <a:ea typeface="+mn-ea"/>
+                <a:cs typeface="+mn-cs"/>
+              </a:defRPr>
+            </a:lvl2pPr>
+            <a:lvl3pPr marL="914400" algn="l" defTabSz="914400" rtl="0" eaLnBrk="1" latinLnBrk="0" hangingPunct="1">
+              <a:defRPr sz="1800" kern="1200">
+                <a:solidFill>
+                  <a:schemeClr val="lt1"/>
+                </a:solidFill>
+                <a:latin typeface="+mn-lt"/>
+                <a:ea typeface="+mn-ea"/>
+                <a:cs typeface="+mn-cs"/>
+              </a:defRPr>
+            </a:lvl3pPr>
+            <a:lvl4pPr marL="1371600" algn="l" defTabSz="914400" rtl="0" eaLnBrk="1" latinLnBrk="0" hangingPunct="1">
+              <a:defRPr sz="1800" kern="1200">
+                <a:solidFill>
+                  <a:schemeClr val="lt1"/>
+                </a:solidFill>
+                <a:latin typeface="+mn-lt"/>
+                <a:ea typeface="+mn-ea"/>
+                <a:cs typeface="+mn-cs"/>
+              </a:defRPr>
+            </a:lvl4pPr>
+            <a:lvl5pPr marL="1828800" algn="l" defTabSz="914400" rtl="0" eaLnBrk="1" latinLnBrk="0" hangingPunct="1">
+              <a:defRPr sz="1800" kern="1200">
+                <a:solidFill>
+                  <a:schemeClr val="lt1"/>
+                </a:solidFill>
+                <a:latin typeface="+mn-lt"/>
+                <a:ea typeface="+mn-ea"/>
+                <a:cs typeface="+mn-cs"/>
+              </a:defRPr>
+            </a:lvl5pPr>
+            <a:lvl6pPr marL="2286000" algn="l" defTabSz="914400" rtl="0" eaLnBrk="1" latinLnBrk="0" hangingPunct="1">
+              <a:defRPr sz="1800" kern="1200">
+                <a:solidFill>
+                  <a:schemeClr val="lt1"/>
+                </a:solidFill>
+                <a:latin typeface="+mn-lt"/>
+                <a:ea typeface="+mn-ea"/>
+                <a:cs typeface="+mn-cs"/>
+              </a:defRPr>
+            </a:lvl6pPr>
+            <a:lvl7pPr marL="2743200" algn="l" defTabSz="914400" rtl="0" eaLnBrk="1" latinLnBrk="0" hangingPunct="1">
+              <a:defRPr sz="1800" kern="1200">
+                <a:solidFill>
+                  <a:schemeClr val="lt1"/>
+                </a:solidFill>
+                <a:latin typeface="+mn-lt"/>
+                <a:ea typeface="+mn-ea"/>
+                <a:cs typeface="+mn-cs"/>
+              </a:defRPr>
+            </a:lvl7pPr>
+            <a:lvl8pPr marL="3200400" algn="l" defTabSz="914400" rtl="0" eaLnBrk="1" latinLnBrk="0" hangingPunct="1">
+              <a:defRPr sz="1800" kern="1200">
+                <a:solidFill>
+                  <a:schemeClr val="lt1"/>
+                </a:solidFill>
+                <a:latin typeface="+mn-lt"/>
+                <a:ea typeface="+mn-ea"/>
+                <a:cs typeface="+mn-cs"/>
+              </a:defRPr>
+            </a:lvl8pPr>
+            <a:lvl9pPr marL="3657600" algn="l" defTabSz="914400" rtl="0" eaLnBrk="1" latinLnBrk="0" hangingPunct="1">
+              <a:defRPr sz="1800" kern="1200">
+                <a:solidFill>
+                  <a:schemeClr val="lt1"/>
+                </a:solidFill>
+                <a:latin typeface="+mn-lt"/>
+                <a:ea typeface="+mn-ea"/>
+                <a:cs typeface="+mn-cs"/>
+              </a:defRPr>
+            </a:lvl9pPr>
+          </a:lstStyle>
+          <a:p>
+            <a:pPr algn="ctr"/>
+            <a:endParaRPr lang="en-US" dirty="0">
+              <a:solidFill>
+                <a:srgbClr val="FFFFFF"/>
+              </a:solidFill>
+            </a:endParaRPr>
+          </a:p>
+        </p:txBody>
+      </p:sp>
+      <p:sp>
+        <p:nvSpPr>
+          <p:cNvPr id="2" name="Title 1">
+            <a:extLst>
+              <a:ext uri="{FF2B5EF4-FFF2-40B4-BE49-F238E27FC236}">
+                <a16:creationId xmlns:a16="http://schemas.microsoft.com/office/drawing/2014/main" id="{242AAF47-7888-478B-96F0-BEB85F97CDA6}"/>
+              </a:ext>
+            </a:extLst>
+          </p:cNvPr>
+          <p:cNvSpPr>
+            <a:spLocks noGrp="1"/>
+          </p:cNvSpPr>
+          <p:nvPr>
+            <p:ph type="title"/>
+          </p:nvPr>
+        </p:nvSpPr>
+        <p:spPr>
+          <a:xfrm>
+            <a:off x="6449961" y="284176"/>
+            <a:ext cx="5094980" cy="1508760"/>
+          </a:xfrm>
+        </p:spPr>
+        <p:txBody>
+          <a:bodyPr>
+            <a:normAutofit/>
+          </a:bodyPr>
+          <a:lstStyle/>
+          <a:p>
+            <a:r>
+              <a:rPr lang="en-US"/>
+              <a:t>SOLOMON</a:t>
+            </a:r>
+            <a:endParaRPr lang="en-GB"/>
+          </a:p>
+        </p:txBody>
+      </p:sp>
+      <p:pic>
+        <p:nvPicPr>
+          <p:cNvPr id="12" name="Picture 11" descr="A picture containing indoor, person, window, table&#10;&#10;Description automatically generated">
+            <a:extLst>
+              <a:ext uri="{FF2B5EF4-FFF2-40B4-BE49-F238E27FC236}">
+                <a16:creationId xmlns:a16="http://schemas.microsoft.com/office/drawing/2014/main" id="{DD3DBD26-3209-BA47-BC0D-0F985BBF2B89}"/>
+              </a:ext>
+            </a:extLst>
+          </p:cNvPr>
+          <p:cNvPicPr>
+            <a:picLocks noChangeAspect="1"/>
+          </p:cNvPicPr>
+          <p:nvPr/>
+        </p:nvPicPr>
+        <p:blipFill rotWithShape="1">
+          <a:blip r:embed="rId2">
+            <a:extLst>
+              <a:ext uri="{28A0092B-C50C-407E-A947-70E740481C1C}">
+                <a14:useLocalDpi xmlns:a14="http://schemas.microsoft.com/office/drawing/2010/main" val="0"/>
+              </a:ext>
+            </a:extLst>
+          </a:blip>
+          <a:srcRect l="1" r="13121" b="-3"/>
+          <a:stretch/>
+        </p:blipFill>
+        <p:spPr>
+          <a:xfrm rot="5400000">
+            <a:off x="250202" y="982706"/>
+            <a:ext cx="5619286" cy="4851141"/>
+          </a:xfrm>
+          <a:prstGeom prst="rect">
+            <a:avLst/>
+          </a:prstGeom>
+        </p:spPr>
+      </p:pic>
+      <p:sp>
+        <p:nvSpPr>
+          <p:cNvPr id="3" name="Content Placeholder 2">
+            <a:extLst>
+              <a:ext uri="{FF2B5EF4-FFF2-40B4-BE49-F238E27FC236}">
+                <a16:creationId xmlns:a16="http://schemas.microsoft.com/office/drawing/2014/main" id="{471CCB88-6F1D-47AA-8042-15BB4B335CD2}"/>
+              </a:ext>
+            </a:extLst>
+          </p:cNvPr>
+          <p:cNvSpPr>
+            <a:spLocks noGrp="1"/>
+          </p:cNvSpPr>
+          <p:nvPr>
+            <p:ph idx="1"/>
+          </p:nvPr>
+        </p:nvSpPr>
+        <p:spPr>
+          <a:xfrm>
+            <a:off x="6454363" y="2011680"/>
+            <a:ext cx="5090578" cy="4206240"/>
+          </a:xfrm>
+        </p:spPr>
+        <p:txBody>
+          <a:bodyPr>
+            <a:normAutofit/>
+          </a:bodyPr>
+          <a:lstStyle/>
+          <a:p>
+            <a:pPr marL="0" indent="0">
+              <a:buNone/>
+            </a:pPr>
+            <a:r>
+              <a:rPr lang="en-US"/>
+              <a:t>Primary Role:</a:t>
+            </a:r>
+          </a:p>
+          <a:p>
+            <a:r>
+              <a:rPr lang="en-US"/>
+              <a:t>Technical Lead</a:t>
+            </a:r>
+          </a:p>
+          <a:p>
+            <a:endParaRPr lang="en-US"/>
+          </a:p>
+          <a:p>
+            <a:pPr marL="0" indent="0">
+              <a:buNone/>
+            </a:pPr>
+            <a:r>
+              <a:rPr lang="en-US"/>
+              <a:t>Secondary Role(s):</a:t>
+            </a:r>
+          </a:p>
+          <a:p>
+            <a:r>
+              <a:rPr lang="en-US"/>
+              <a:t>Repo Manager</a:t>
+            </a:r>
+          </a:p>
+          <a:p>
+            <a:r>
+              <a:rPr lang="en-US"/>
+              <a:t>Technical Relations Manager</a:t>
+            </a:r>
+          </a:p>
+          <a:p>
+            <a:endParaRPr lang="en-GB"/>
           </a:p>
         </p:txBody>
       </p:sp>

</xml_diff>